<commit_message>
ppt rmd and output
</commit_message>
<xml_diff>
--- a/ppt.pptx
+++ b/ppt.pptx
@@ -10,6 +10,15 @@
     <p:sldId id="258" r:id="rId4"/>
     <p:sldId id="259" r:id="rId5"/>
     <p:sldId id="260" r:id="rId6"/>
+    <p:sldId id="261" r:id="rId7"/>
+    <p:sldId id="262" r:id="rId8"/>
+    <p:sldId id="263" r:id="rId9"/>
+    <p:sldId id="264" r:id="rId10"/>
+    <p:sldId id="265" r:id="rId11"/>
+    <p:sldId id="266" r:id="rId12"/>
+    <p:sldId id="267" r:id="rId13"/>
+    <p:sldId id="268" r:id="rId14"/>
+    <p:sldId id="269" r:id="rId15"/>
   </p:sldIdLst>
   <p:sldSz cx="9144000" cy="6858000" type="screen4x3"/>
   <p:notesSz cx="6858000" cy="9144000"/>
@@ -4552,7 +4561,7 @@
 </p:sld>
 </file>
 
-<file path=ppt/slides/slide2.xml><?xml version="1.0" encoding="utf-8"?>
+<file path=ppt/slides/slide10.xml><?xml version="1.0" encoding="utf-8"?>
 <p:sld xmlns:a="http://schemas.openxmlformats.org/drawingml/2006/main" xmlns:r="http://schemas.openxmlformats.org/officeDocument/2006/relationships" xmlns:p="http://schemas.openxmlformats.org/presentationml/2006/main">
   <p:cSld>
     <p:spTree>
@@ -4641,7 +4650,7 @@
             </a:r>
             <a:r>
               <a:rPr/>
-              <a:t> button a document will be generated that includes both content as well as the output of any embedded R code chunks within the document.</a:t>
+              <a:t> button a document will be generated that includes both content as well as the output of any embedded R code chunks w ithin the document.</a:t>
             </a:r>
           </a:p>
         </p:txBody>
@@ -4693,7 +4702,7 @@
 </p:sld>
 </file>
 
-<file path=ppt/slides/slide3.xml><?xml version="1.0" encoding="utf-8"?>
+<file path=ppt/slides/slide11.xml><?xml version="1.0" encoding="utf-8"?>
 <p:sld xmlns:a="http://schemas.openxmlformats.org/drawingml/2006/main" xmlns:r="http://schemas.openxmlformats.org/officeDocument/2006/relationships" xmlns:p="http://schemas.openxmlformats.org/presentationml/2006/main">
   <p:cSld>
     <p:spTree>
@@ -4730,44 +4739,7 @@
             </a:pPr>
             <a:r>
               <a:rPr/>
-              <a:t>Slide with Bullets</a:t>
-            </a:r>
-          </a:p>
-        </p:txBody>
-      </p:sp>
-      <p:sp>
-        <p:nvSpPr>
-          <p:cNvPr id="3" name="Content Placeholder 2"/>
-          <p:cNvSpPr>
-            <a:spLocks noGrp="1"/>
-          </p:cNvSpPr>
-          <p:nvPr>
-            <p:ph idx="1"/>
-          </p:nvPr>
-        </p:nvSpPr>
-        <p:spPr/>
-        <p:txBody>
-          <a:bodyPr/>
-          <a:lstStyle/>
-          <a:p>
-            <a:pPr lvl="0"/>
-            <a:r>
-              <a:rPr/>
-              <a:t>Bullet 1</a:t>
-            </a:r>
-          </a:p>
-          <a:p>
-            <a:pPr lvl="0"/>
-            <a:r>
-              <a:rPr/>
-              <a:t>Bullet 2</a:t>
-            </a:r>
-          </a:p>
-          <a:p>
-            <a:pPr lvl="0"/>
-            <a:r>
-              <a:rPr/>
-              <a:t>Bullet 3</a:t>
+              <a:t>Slide with Results</a:t>
             </a:r>
           </a:p>
         </p:txBody>
@@ -4819,7 +4791,7 @@
 </p:sld>
 </file>
 
-<file path=ppt/slides/slide4.xml><?xml version="1.0" encoding="utf-8"?>
+<file path=ppt/slides/slide12.xml><?xml version="1.0" encoding="utf-8"?>
 <p:sld xmlns:a="http://schemas.openxmlformats.org/drawingml/2006/main" xmlns:r="http://schemas.openxmlformats.org/officeDocument/2006/relationships" xmlns:p="http://schemas.openxmlformats.org/presentationml/2006/main">
   <p:cSld>
     <p:spTree>
@@ -4856,7 +4828,7 @@
             </a:pPr>
             <a:r>
               <a:rPr/>
-              <a:t>Slide with R Output</a:t>
+              <a:t>Slide with Bullets</a:t>
             </a:r>
           </a:p>
         </p:txBody>
@@ -4876,40 +4848,24 @@
           <a:bodyPr/>
           <a:lstStyle/>
           <a:p>
-            <a:pPr lvl="0" indent="0">
-              <a:buNone/>
-            </a:pPr>
-            <a:r>
-              <a:rPr>
-                <a:solidFill>
-                  <a:srgbClr val="06287E"/>
-                </a:solidFill>
-                <a:latin typeface="Courier"/>
-              </a:rPr>
-              <a:t>summary</a:t>
-            </a:r>
-            <a:r>
-              <a:rPr>
-                <a:latin typeface="Courier"/>
-              </a:rPr>
-              <a:t>(cars)</a:t>
-            </a:r>
-          </a:p>
-          <a:p>
-            <a:pPr lvl="0" indent="0">
-              <a:buNone/>
-            </a:pPr>
-            <a:r>
-              <a:rPr>
-                <a:latin typeface="Courier"/>
-              </a:rPr>
-              <a:t>##      speed           dist       
-##  Min.   : 4.0   Min.   :  2.00  
-##  1st Qu.:12.0   1st Qu.: 26.00  
-##  Median :15.0   Median : 36.00  
-##  Mean   :15.4   Mean   : 42.98  
-##  3rd Qu.:19.0   3rd Qu.: 56.00  
-##  Max.   :25.0   Max.   :120.00</a:t>
+            <a:pPr lvl="0"/>
+            <a:r>
+              <a:rPr/>
+              <a:t>Bullet 1</a:t>
+            </a:r>
+          </a:p>
+          <a:p>
+            <a:pPr lvl="0"/>
+            <a:r>
+              <a:rPr/>
+              <a:t>Bullet 2</a:t>
+            </a:r>
+          </a:p>
+          <a:p>
+            <a:pPr lvl="0"/>
+            <a:r>
+              <a:rPr/>
+              <a:t>Bullet 3</a:t>
             </a:r>
           </a:p>
         </p:txBody>
@@ -4961,7 +4917,7 @@
 </p:sld>
 </file>
 
-<file path=ppt/slides/slide5.xml><?xml version="1.0" encoding="utf-8"?>
+<file path=ppt/slides/slide13.xml><?xml version="1.0" encoding="utf-8"?>
 <p:sld xmlns:a="http://schemas.openxmlformats.org/drawingml/2006/main" xmlns:r="http://schemas.openxmlformats.org/officeDocument/2006/relationships" xmlns:p="http://schemas.openxmlformats.org/presentationml/2006/main">
   <p:cSld>
     <p:spTree>
@@ -4998,6 +4954,148 @@
             </a:pPr>
             <a:r>
               <a:rPr/>
+              <a:t>Slide with R Output</a:t>
+            </a:r>
+          </a:p>
+        </p:txBody>
+      </p:sp>
+      <p:sp>
+        <p:nvSpPr>
+          <p:cNvPr id="3" name="Content Placeholder 2"/>
+          <p:cNvSpPr>
+            <a:spLocks noGrp="1"/>
+          </p:cNvSpPr>
+          <p:nvPr>
+            <p:ph idx="1"/>
+          </p:nvPr>
+        </p:nvSpPr>
+        <p:spPr/>
+        <p:txBody>
+          <a:bodyPr/>
+          <a:lstStyle/>
+          <a:p>
+            <a:pPr lvl="0" indent="0">
+              <a:buNone/>
+            </a:pPr>
+            <a:r>
+              <a:rPr>
+                <a:solidFill>
+                  <a:srgbClr val="06287E"/>
+                </a:solidFill>
+                <a:latin typeface="Courier"/>
+              </a:rPr>
+              <a:t>summary</a:t>
+            </a:r>
+            <a:r>
+              <a:rPr>
+                <a:latin typeface="Courier"/>
+              </a:rPr>
+              <a:t>(cars)</a:t>
+            </a:r>
+          </a:p>
+          <a:p>
+            <a:pPr lvl="0" indent="0">
+              <a:buNone/>
+            </a:pPr>
+            <a:r>
+              <a:rPr>
+                <a:latin typeface="Courier"/>
+              </a:rPr>
+              <a:t>##      speed           dist       
+##  Min.   : 4.0   Min.   :  2.00  
+##  1st Qu.:12.0   1st Qu.: 26.00  
+##  Median :15.0   Median : 36.00  
+##  Mean   :15.4   Mean   : 42.98  
+##  3rd Qu.:19.0   3rd Qu.: 56.00  
+##  Max.   :25.0   Max.   :120.00</a:t>
+            </a:r>
+          </a:p>
+        </p:txBody>
+      </p:sp>
+      <p:sp>
+        <p:nvSpPr>
+          <p:cNvPr id="5" name="Footer Placeholder 4"/>
+          <p:cNvSpPr>
+            <a:spLocks noGrp="1"/>
+          </p:cNvSpPr>
+          <p:nvPr>
+            <p:ph idx="11" sz="quarter" type="ftr"/>
+          </p:nvPr>
+        </p:nvSpPr>
+        <p:spPr/>
+        <p:txBody>
+          <a:bodyPr/>
+          <a:lstStyle/>
+          <a:p>
+            <a:endParaRPr lang="en-US"/>
+          </a:p>
+        </p:txBody>
+      </p:sp>
+      <p:sp>
+        <p:nvSpPr>
+          <p:cNvPr id="6" name="Slide Number Placeholder 5"/>
+          <p:cNvSpPr>
+            <a:spLocks noGrp="1"/>
+          </p:cNvSpPr>
+          <p:nvPr>
+            <p:ph idx="12" sz="quarter" type="sldNum"/>
+          </p:nvPr>
+        </p:nvSpPr>
+        <p:spPr/>
+        <p:txBody>
+          <a:bodyPr/>
+          <a:lstStyle/>
+          <a:p>
+            <a:fld id="{C5EF2332-01BF-834F-8236-50238282D533}" type="slidenum">
+              <a:rPr lang="en-US" smtClean="0"/>
+              <a:t>‹#›</a:t>
+            </a:fld>
+            <a:endParaRPr lang="en-US"/>
+          </a:p>
+        </p:txBody>
+      </p:sp>
+    </p:spTree>
+  </p:cSld>
+</p:sld>
+</file>
+
+<file path=ppt/slides/slide14.xml><?xml version="1.0" encoding="utf-8"?>
+<p:sld xmlns:a="http://schemas.openxmlformats.org/drawingml/2006/main" xmlns:r="http://schemas.openxmlformats.org/officeDocument/2006/relationships" xmlns:p="http://schemas.openxmlformats.org/presentationml/2006/main">
+  <p:cSld>
+    <p:spTree>
+      <p:nvGrpSpPr>
+        <p:cNvPr id="1" name=""/>
+        <p:cNvGrpSpPr/>
+        <p:nvPr/>
+      </p:nvGrpSpPr>
+      <p:grpSpPr>
+        <a:xfrm>
+          <a:off x="0" y="0"/>
+          <a:ext cx="0" cy="0"/>
+          <a:chOff x="0" y="0"/>
+          <a:chExt cx="0" cy="0"/>
+        </a:xfrm>
+      </p:grpSpPr>
+      <p:sp>
+        <p:nvSpPr>
+          <p:cNvPr id="2" name="Title 1"/>
+          <p:cNvSpPr>
+            <a:spLocks noGrp="1"/>
+          </p:cNvSpPr>
+          <p:nvPr>
+            <p:ph type="title"/>
+          </p:nvPr>
+        </p:nvSpPr>
+        <p:spPr/>
+        <p:txBody>
+          <a:bodyPr/>
+          <a:lstStyle/>
+          <a:p>
+            <a:pPr lvl="0" indent="0" marL="0">
+              <a:buNone/>
+            </a:pPr>
+            <a:r>
+              <a:rPr/>
               <a:t>Slide with Plot</a:t>
             </a:r>
           </a:p>
@@ -5005,7 +5103,7 @@
       </p:sp>
       <p:pic>
         <p:nvPicPr>
-          <p:cNvPr descr="ppt_files/figure-pptx/pressure-1.png" id="0" name="Picture 1"/>
+          <p:cNvPr descr="ppt_yi_files/figure-pptx/pressure-1.png" id="0" name="Picture 1"/>
           <p:cNvPicPr>
             <a:picLocks noGrp="1" noChangeAspect="1"/>
           </p:cNvPicPr>
@@ -5033,6 +5131,4045 @@
           </a:ln>
         </p:spPr>
       </p:pic>
+      <p:sp>
+        <p:nvSpPr>
+          <p:cNvPr id="5" name="Footer Placeholder 4"/>
+          <p:cNvSpPr>
+            <a:spLocks noGrp="1"/>
+          </p:cNvSpPr>
+          <p:nvPr>
+            <p:ph idx="11" sz="quarter" type="ftr"/>
+          </p:nvPr>
+        </p:nvSpPr>
+        <p:spPr/>
+        <p:txBody>
+          <a:bodyPr/>
+          <a:lstStyle/>
+          <a:p>
+            <a:endParaRPr lang="en-US"/>
+          </a:p>
+        </p:txBody>
+      </p:sp>
+      <p:sp>
+        <p:nvSpPr>
+          <p:cNvPr id="6" name="Slide Number Placeholder 5"/>
+          <p:cNvSpPr>
+            <a:spLocks noGrp="1"/>
+          </p:cNvSpPr>
+          <p:nvPr>
+            <p:ph idx="12" sz="quarter" type="sldNum"/>
+          </p:nvPr>
+        </p:nvSpPr>
+        <p:spPr/>
+        <p:txBody>
+          <a:bodyPr/>
+          <a:lstStyle/>
+          <a:p>
+            <a:fld id="{C5EF2332-01BF-834F-8236-50238282D533}" type="slidenum">
+              <a:rPr lang="en-US" smtClean="0"/>
+              <a:t>‹#›</a:t>
+            </a:fld>
+            <a:endParaRPr lang="en-US"/>
+          </a:p>
+        </p:txBody>
+      </p:sp>
+    </p:spTree>
+  </p:cSld>
+</p:sld>
+</file>
+
+<file path=ppt/slides/slide2.xml><?xml version="1.0" encoding="utf-8"?>
+<p:sld xmlns:a="http://schemas.openxmlformats.org/drawingml/2006/main" xmlns:r="http://schemas.openxmlformats.org/officeDocument/2006/relationships" xmlns:p="http://schemas.openxmlformats.org/presentationml/2006/main">
+  <p:cSld>
+    <p:spTree>
+      <p:nvGrpSpPr>
+        <p:cNvPr id="1" name=""/>
+        <p:cNvGrpSpPr/>
+        <p:nvPr/>
+      </p:nvGrpSpPr>
+      <p:grpSpPr>
+        <a:xfrm>
+          <a:off x="0" y="0"/>
+          <a:ext cx="0" cy="0"/>
+          <a:chOff x="0" y="0"/>
+          <a:chExt cx="0" cy="0"/>
+        </a:xfrm>
+      </p:grpSpPr>
+      <p:sp>
+        <p:nvSpPr>
+          <p:cNvPr id="2" name="Title 1"/>
+          <p:cNvSpPr>
+            <a:spLocks noGrp="1"/>
+          </p:cNvSpPr>
+          <p:nvPr>
+            <p:ph type="title"/>
+          </p:nvPr>
+        </p:nvSpPr>
+        <p:spPr/>
+        <p:txBody>
+          <a:bodyPr/>
+          <a:lstStyle/>
+          <a:p>
+            <a:pPr lvl="0" indent="0" marL="0">
+              <a:buNone/>
+            </a:pPr>
+            <a:r>
+              <a:rPr/>
+              <a:t>Background</a:t>
+            </a:r>
+          </a:p>
+        </p:txBody>
+      </p:sp>
+      <p:sp>
+        <p:nvSpPr>
+          <p:cNvPr id="5" name="Footer Placeholder 4"/>
+          <p:cNvSpPr>
+            <a:spLocks noGrp="1"/>
+          </p:cNvSpPr>
+          <p:nvPr>
+            <p:ph idx="11" sz="quarter" type="ftr"/>
+          </p:nvPr>
+        </p:nvSpPr>
+        <p:spPr/>
+        <p:txBody>
+          <a:bodyPr/>
+          <a:lstStyle/>
+          <a:p>
+            <a:endParaRPr lang="en-US"/>
+          </a:p>
+        </p:txBody>
+      </p:sp>
+      <p:sp>
+        <p:nvSpPr>
+          <p:cNvPr id="6" name="Slide Number Placeholder 5"/>
+          <p:cNvSpPr>
+            <a:spLocks noGrp="1"/>
+          </p:cNvSpPr>
+          <p:nvPr>
+            <p:ph idx="12" sz="quarter" type="sldNum"/>
+          </p:nvPr>
+        </p:nvSpPr>
+        <p:spPr/>
+        <p:txBody>
+          <a:bodyPr/>
+          <a:lstStyle/>
+          <a:p>
+            <a:fld id="{C5EF2332-01BF-834F-8236-50238282D533}" type="slidenum">
+              <a:rPr lang="en-US" smtClean="0"/>
+              <a:t>‹#›</a:t>
+            </a:fld>
+            <a:endParaRPr lang="en-US"/>
+          </a:p>
+        </p:txBody>
+      </p:sp>
+    </p:spTree>
+  </p:cSld>
+</p:sld>
+</file>
+
+<file path=ppt/slides/slide3.xml><?xml version="1.0" encoding="utf-8"?>
+<p:sld xmlns:a="http://schemas.openxmlformats.org/drawingml/2006/main" xmlns:r="http://schemas.openxmlformats.org/officeDocument/2006/relationships" xmlns:p="http://schemas.openxmlformats.org/presentationml/2006/main">
+  <p:cSld>
+    <p:spTree>
+      <p:nvGrpSpPr>
+        <p:cNvPr id="1" name=""/>
+        <p:cNvGrpSpPr/>
+        <p:nvPr/>
+      </p:nvGrpSpPr>
+      <p:grpSpPr>
+        <a:xfrm>
+          <a:off x="0" y="0"/>
+          <a:ext cx="0" cy="0"/>
+          <a:chOff x="0" y="0"/>
+          <a:chExt cx="0" cy="0"/>
+        </a:xfrm>
+      </p:grpSpPr>
+      <p:sp>
+        <p:nvSpPr>
+          <p:cNvPr id="2" name="Title 1"/>
+          <p:cNvSpPr>
+            <a:spLocks noGrp="1"/>
+          </p:cNvSpPr>
+          <p:nvPr>
+            <p:ph type="title"/>
+          </p:nvPr>
+        </p:nvSpPr>
+        <p:spPr/>
+        <p:txBody>
+          <a:bodyPr/>
+          <a:lstStyle/>
+          <a:p>
+            <a:pPr lvl="0" indent="0" marL="0">
+              <a:buNone/>
+            </a:pPr>
+            <a:r>
+              <a:rPr/>
+              <a:t>Methodology</a:t>
+            </a:r>
+          </a:p>
+        </p:txBody>
+      </p:sp>
+      <mc:AlternateContent xmlns:mc="http://schemas.openxmlformats.org/markup-compatibility/2006">
+        <mc:Choice xmlns:a14="http://schemas.microsoft.com/office/drawing/2010/main" Requires="a14">
+          <p:sp>
+            <p:nvSpPr>
+              <p:cNvPr id="3" name="Content Placeholder 2"/>
+              <p:cNvSpPr>
+                <a:spLocks noGrp="1"/>
+              </p:cNvSpPr>
+              <p:nvPr>
+                <p:ph idx="1"/>
+              </p:nvPr>
+            </p:nvSpPr>
+            <p:spPr/>
+            <p:txBody>
+              <a:bodyPr/>
+              <a:lstStyle/>
+              <a:p>
+                <a:pPr lvl="0" indent="0" marL="0">
+                  <a:buNone/>
+                </a:pPr>
+                <a:r>
+                  <a:rPr/>
+                  <a:t>Survival function measures the probability of observing individual survival time </a:t>
+                </a:r>
+                <a14:m>
+                  <m:oMath xmlns:m="http://schemas.openxmlformats.org/officeDocument/2006/math">
+                    <m:r>
+                      <m:t>T</m:t>
+                    </m:r>
+                  </m:oMath>
+                </a14:m>
+                <a:r>
+                  <a:rPr/>
+                  <a:t> beyond a certain time </a:t>
+                </a:r>
+                <a14:m>
+                  <m:oMath xmlns:m="http://schemas.openxmlformats.org/officeDocument/2006/math">
+                    <m:r>
+                      <m:t>t</m:t>
+                    </m:r>
+                  </m:oMath>
+                </a14:m>
+                <a:br/>
+                <a14:m>
+                  <m:oMath xmlns:m="http://schemas.openxmlformats.org/officeDocument/2006/math">
+                    <m:r>
+                      <m:t>S</m:t>
+                    </m:r>
+                    <m:d>
+                      <m:dPr>
+                        <m:begChr m:val="("/>
+                        <m:endChr m:val=")"/>
+                        <m:sepChr m:val=""/>
+                        <m:grow/>
+                      </m:dPr>
+                      <m:e>
+                        <m:r>
+                          <m:t>t</m:t>
+                        </m:r>
+                      </m:e>
+                    </m:d>
+                    <m:r>
+                      <m:rPr>
+                        <m:sty m:val="p"/>
+                      </m:rPr>
+                      <m:t>=</m:t>
+                    </m:r>
+                    <m:r>
+                      <m:t>P</m:t>
+                    </m:r>
+                    <m:r>
+                      <m:t>r</m:t>
+                    </m:r>
+                    <m:d>
+                      <m:dPr>
+                        <m:begChr m:val="("/>
+                        <m:endChr m:val=")"/>
+                        <m:sepChr m:val=""/>
+                        <m:grow/>
+                      </m:dPr>
+                      <m:e>
+                        <m:r>
+                          <m:t>T</m:t>
+                        </m:r>
+                        <m:r>
+                          <m:rPr>
+                            <m:sty m:val="p"/>
+                          </m:rPr>
+                          <m:t>&gt;</m:t>
+                        </m:r>
+                        <m:r>
+                          <m:t>t</m:t>
+                        </m:r>
+                      </m:e>
+                    </m:d>
+                    <m:r>
+                      <m:rPr>
+                        <m:sty m:val="p"/>
+                      </m:rPr>
+                      <m:t>=</m:t>
+                    </m:r>
+                    <m:nary>
+                      <m:naryPr>
+                        <m:chr m:val="∫"/>
+                        <m:limLoc m:val="subSup"/>
+                        <m:subHide m:val="0"/>
+                        <m:supHide m:val="0"/>
+                      </m:naryPr>
+                      <m:sub>
+                        <m:r>
+                          <m:t>t</m:t>
+                        </m:r>
+                      </m:sub>
+                      <m:sup>
+                        <m:r>
+                          <m:rPr>
+                            <m:sty m:val="p"/>
+                          </m:rPr>
+                          <m:t>∞</m:t>
+                        </m:r>
+                      </m:sup>
+                      <m:e>
+                        <m:r>
+                          <m:t>f</m:t>
+                        </m:r>
+                      </m:e>
+                    </m:nary>
+                    <m:d>
+                      <m:dPr>
+                        <m:begChr m:val="("/>
+                        <m:endChr m:val=")"/>
+                        <m:sepChr m:val=""/>
+                        <m:grow/>
+                      </m:dPr>
+                      <m:e>
+                        <m:r>
+                          <m:t>s</m:t>
+                        </m:r>
+                      </m:e>
+                    </m:d>
+                    <m:r>
+                      <m:t>d</m:t>
+                    </m:r>
+                    <m:r>
+                      <m:t>s</m:t>
+                    </m:r>
+                  </m:oMath>
+                </a14:m>
+                <a:br/>
+                <a:r>
+                  <a:rPr/>
+                  <a:t>Cumulative Distribution Function of survival time T</a:t>
+                </a:r>
+                <a:br/>
+                <a14:m>
+                  <m:oMath xmlns:m="http://schemas.openxmlformats.org/officeDocument/2006/math">
+                    <m:r>
+                      <m:t>F</m:t>
+                    </m:r>
+                    <m:d>
+                      <m:dPr>
+                        <m:begChr m:val="("/>
+                        <m:endChr m:val=")"/>
+                        <m:sepChr m:val=""/>
+                        <m:grow/>
+                      </m:dPr>
+                      <m:e>
+                        <m:r>
+                          <m:t>t</m:t>
+                        </m:r>
+                      </m:e>
+                    </m:d>
+                    <m:r>
+                      <m:rPr>
+                        <m:sty m:val="p"/>
+                      </m:rPr>
+                      <m:t>=</m:t>
+                    </m:r>
+                    <m:r>
+                      <m:t>P</m:t>
+                    </m:r>
+                    <m:r>
+                      <m:t>r</m:t>
+                    </m:r>
+                    <m:d>
+                      <m:dPr>
+                        <m:begChr m:val="("/>
+                        <m:endChr m:val=")"/>
+                        <m:sepChr m:val=""/>
+                        <m:grow/>
+                      </m:dPr>
+                      <m:e>
+                        <m:r>
+                          <m:t>T</m:t>
+                        </m:r>
+                        <m:r>
+                          <m:rPr>
+                            <m:sty m:val="p"/>
+                          </m:rPr>
+                          <m:t>≤</m:t>
+                        </m:r>
+                        <m:r>
+                          <m:t>t</m:t>
+                        </m:r>
+                      </m:e>
+                    </m:d>
+                    <m:r>
+                      <m:rPr>
+                        <m:sty m:val="p"/>
+                      </m:rPr>
+                      <m:t>=</m:t>
+                    </m:r>
+                    <m:r>
+                      <m:t>1</m:t>
+                    </m:r>
+                    <m:r>
+                      <m:rPr>
+                        <m:sty m:val="p"/>
+                      </m:rPr>
+                      <m:t>−</m:t>
+                    </m:r>
+                    <m:r>
+                      <m:t>S</m:t>
+                    </m:r>
+                    <m:d>
+                      <m:dPr>
+                        <m:begChr m:val="("/>
+                        <m:endChr m:val=")"/>
+                        <m:sepChr m:val=""/>
+                        <m:grow/>
+                      </m:dPr>
+                      <m:e>
+                        <m:r>
+                          <m:t>t</m:t>
+                        </m:r>
+                      </m:e>
+                    </m:d>
+                    <m:r>
+                      <m:rPr>
+                        <m:sty m:val="p"/>
+                      </m:rPr>
+                      <m:t>=</m:t>
+                    </m:r>
+                    <m:r>
+                      <m:t>1</m:t>
+                    </m:r>
+                    <m:r>
+                      <m:rPr>
+                        <m:sty m:val="p"/>
+                      </m:rPr>
+                      <m:t>−</m:t>
+                    </m:r>
+                    <m:nary>
+                      <m:naryPr>
+                        <m:chr m:val="∫"/>
+                        <m:limLoc m:val="subSup"/>
+                        <m:subHide m:val="0"/>
+                        <m:supHide m:val="0"/>
+                      </m:naryPr>
+                      <m:sub>
+                        <m:r>
+                          <m:t>t</m:t>
+                        </m:r>
+                      </m:sub>
+                      <m:sup>
+                        <m:r>
+                          <m:rPr>
+                            <m:sty m:val="p"/>
+                          </m:rPr>
+                          <m:t>∞</m:t>
+                        </m:r>
+                      </m:sup>
+                      <m:e>
+                        <m:r>
+                          <m:t>f</m:t>
+                        </m:r>
+                      </m:e>
+                    </m:nary>
+                    <m:d>
+                      <m:dPr>
+                        <m:begChr m:val="("/>
+                        <m:endChr m:val=")"/>
+                        <m:sepChr m:val=""/>
+                        <m:grow/>
+                      </m:dPr>
+                      <m:e>
+                        <m:r>
+                          <m:t>s</m:t>
+                        </m:r>
+                      </m:e>
+                    </m:d>
+                    <m:r>
+                      <m:t>d</m:t>
+                    </m:r>
+                    <m:r>
+                      <m:t>s</m:t>
+                    </m:r>
+                  </m:oMath>
+                </a14:m>
+                <a:br/>
+                <a:r>
+                  <a:rPr/>
+                  <a:t>Hazard Function</a:t>
+                </a:r>
+                <a:br/>
+                <a14:m>
+                  <m:oMath xmlns:m="http://schemas.openxmlformats.org/officeDocument/2006/math">
+                    <m:r>
+                      <m:t>h</m:t>
+                    </m:r>
+                    <m:d>
+                      <m:dPr>
+                        <m:begChr m:val="("/>
+                        <m:endChr m:val=")"/>
+                        <m:sepChr m:val=""/>
+                        <m:grow/>
+                      </m:dPr>
+                      <m:e>
+                        <m:r>
+                          <m:t>t</m:t>
+                        </m:r>
+                      </m:e>
+                    </m:d>
+                    <m:r>
+                      <m:rPr>
+                        <m:sty m:val="p"/>
+                      </m:rPr>
+                      <m:t>=</m:t>
+                    </m:r>
+                    <m:sSub>
+                      <m:e>
+                        <m:r>
+                          <m:rPr>
+                            <m:sty m:val="p"/>
+                          </m:rPr>
+                          <m:t>lim</m:t>
+                        </m:r>
+                      </m:e>
+                      <m:sub>
+                        <m:sSub>
+                          <m:e>
+                            <m:r>
+                              <m:t>Δ</m:t>
+                            </m:r>
+                          </m:e>
+                          <m:sub>
+                            <m:r>
+                              <m:t>t</m:t>
+                            </m:r>
+                          </m:sub>
+                        </m:sSub>
+                        <m:r>
+                          <m:rPr>
+                            <m:sty m:val="p"/>
+                          </m:rPr>
+                          <m:t>→</m:t>
+                        </m:r>
+                        <m:r>
+                          <m:t>0</m:t>
+                        </m:r>
+                      </m:sub>
+                    </m:sSub>
+                    <m:f>
+                      <m:fPr>
+                        <m:type m:val="bar"/>
+                      </m:fPr>
+                      <m:num>
+                        <m:r>
+                          <m:t>P</m:t>
+                        </m:r>
+                        <m:r>
+                          <m:t>r</m:t>
+                        </m:r>
+                        <m:r>
+                          <m:rPr>
+                            <m:sty m:val="p"/>
+                          </m:rPr>
+                          <m:t>(</m:t>
+                        </m:r>
+                        <m:d>
+                          <m:dPr>
+                            <m:begChr m:val="("/>
+                            <m:endChr m:val=")"/>
+                            <m:sepChr m:val=""/>
+                            <m:grow/>
+                          </m:dPr>
+                          <m:e>
+                            <m:r>
+                              <m:t>T</m:t>
+                            </m:r>
+                            <m:r>
+                              <m:rPr>
+                                <m:sty m:val="p"/>
+                              </m:rPr>
+                              <m:t>∈</m:t>
+                            </m:r>
+                            <m:d>
+                              <m:dPr>
+                                <m:begChr m:val="("/>
+                                <m:endChr m:val=")"/>
+                                <m:sepChr m:val=""/>
+                                <m:grow/>
+                              </m:dPr>
+                              <m:e>
+                                <m:r>
+                                  <m:t>t</m:t>
+                                </m:r>
+                                <m:r>
+                                  <m:rPr>
+                                    <m:sty m:val="p"/>
+                                  </m:rPr>
+                                  <m:t>,</m:t>
+                                </m:r>
+                                <m:r>
+                                  <m:t>t</m:t>
+                                </m:r>
+                                <m:r>
+                                  <m:rPr>
+                                    <m:sty m:val="p"/>
+                                  </m:rPr>
+                                  <m:t>+</m:t>
+                                </m:r>
+                                <m:sSub>
+                                  <m:e>
+                                    <m:r>
+                                      <m:t>Δ</m:t>
+                                    </m:r>
+                                  </m:e>
+                                  <m:sub>
+                                    <m:r>
+                                      <m:t>t</m:t>
+                                    </m:r>
+                                  </m:sub>
+                                </m:sSub>
+                              </m:e>
+                            </m:d>
+                            <m:r>
+                              <m:rPr>
+                                <m:sty m:val="p"/>
+                              </m:rPr>
+                              <m:t>|</m:t>
+                            </m:r>
+                            <m:r>
+                              <m:t>T</m:t>
+                            </m:r>
+                            <m:r>
+                              <m:rPr>
+                                <m:sty m:val="p"/>
+                              </m:rPr>
+                              <m:t>&gt;</m:t>
+                            </m:r>
+                            <m:r>
+                              <m:t>t</m:t>
+                            </m:r>
+                          </m:e>
+                        </m:d>
+                      </m:num>
+                      <m:den>
+                        <m:sSub>
+                          <m:e>
+                            <m:r>
+                              <m:t>Δ</m:t>
+                            </m:r>
+                          </m:e>
+                          <m:sub>
+                            <m:r>
+                              <m:t>t</m:t>
+                            </m:r>
+                          </m:sub>
+                        </m:sSub>
+                      </m:den>
+                    </m:f>
+                    <m:r>
+                      <m:rPr>
+                        <m:sty m:val="p"/>
+                      </m:rPr>
+                      <m:t>=</m:t>
+                    </m:r>
+                    <m:f>
+                      <m:fPr>
+                        <m:type m:val="bar"/>
+                      </m:fPr>
+                      <m:num>
+                        <m:r>
+                          <m:t>f</m:t>
+                        </m:r>
+                        <m:d>
+                          <m:dPr>
+                            <m:begChr m:val="("/>
+                            <m:endChr m:val=")"/>
+                            <m:sepChr m:val=""/>
+                            <m:grow/>
+                          </m:dPr>
+                          <m:e>
+                            <m:r>
+                              <m:t>t</m:t>
+                            </m:r>
+                          </m:e>
+                        </m:d>
+                      </m:num>
+                      <m:den>
+                        <m:r>
+                          <m:t>S</m:t>
+                        </m:r>
+                        <m:d>
+                          <m:dPr>
+                            <m:begChr m:val="("/>
+                            <m:endChr m:val=")"/>
+                            <m:sepChr m:val=""/>
+                            <m:grow/>
+                          </m:dPr>
+                          <m:e>
+                            <m:r>
+                              <m:t>t</m:t>
+                            </m:r>
+                          </m:e>
+                        </m:d>
+                      </m:den>
+                    </m:f>
+                  </m:oMath>
+                </a14:m>
+                <a:br/>
+              </a:p>
+            </p:txBody>
+          </p:sp>
+        </mc:Choice>
+      </mc:AlternateContent>
+      <p:sp>
+        <p:nvSpPr>
+          <p:cNvPr id="5" name="Footer Placeholder 4"/>
+          <p:cNvSpPr>
+            <a:spLocks noGrp="1"/>
+          </p:cNvSpPr>
+          <p:nvPr>
+            <p:ph idx="11" sz="quarter" type="ftr"/>
+          </p:nvPr>
+        </p:nvSpPr>
+        <p:spPr/>
+        <p:txBody>
+          <a:bodyPr/>
+          <a:lstStyle/>
+          <a:p>
+            <a:endParaRPr lang="en-US"/>
+          </a:p>
+        </p:txBody>
+      </p:sp>
+      <p:sp>
+        <p:nvSpPr>
+          <p:cNvPr id="6" name="Slide Number Placeholder 5"/>
+          <p:cNvSpPr>
+            <a:spLocks noGrp="1"/>
+          </p:cNvSpPr>
+          <p:nvPr>
+            <p:ph idx="12" sz="quarter" type="sldNum"/>
+          </p:nvPr>
+        </p:nvSpPr>
+        <p:spPr/>
+        <p:txBody>
+          <a:bodyPr/>
+          <a:lstStyle/>
+          <a:p>
+            <a:fld id="{C5EF2332-01BF-834F-8236-50238282D533}" type="slidenum">
+              <a:rPr lang="en-US" smtClean="0"/>
+              <a:t>‹#›</a:t>
+            </a:fld>
+            <a:endParaRPr lang="en-US"/>
+          </a:p>
+        </p:txBody>
+      </p:sp>
+    </p:spTree>
+  </p:cSld>
+</p:sld>
+</file>
+
+<file path=ppt/slides/slide4.xml><?xml version="1.0" encoding="utf-8"?>
+<p:sld xmlns:a="http://schemas.openxmlformats.org/drawingml/2006/main" xmlns:r="http://schemas.openxmlformats.org/officeDocument/2006/relationships" xmlns:p="http://schemas.openxmlformats.org/presentationml/2006/main">
+  <p:cSld>
+    <p:spTree>
+      <p:nvGrpSpPr>
+        <p:cNvPr id="1" name=""/>
+        <p:cNvGrpSpPr/>
+        <p:nvPr/>
+      </p:nvGrpSpPr>
+      <p:grpSpPr>
+        <a:xfrm>
+          <a:off x="0" y="0"/>
+          <a:ext cx="0" cy="0"/>
+          <a:chOff x="0" y="0"/>
+          <a:chExt cx="0" cy="0"/>
+        </a:xfrm>
+      </p:grpSpPr>
+      <p:sp>
+        <p:nvSpPr>
+          <p:cNvPr id="2" name="Title 1"/>
+          <p:cNvSpPr>
+            <a:spLocks noGrp="1"/>
+          </p:cNvSpPr>
+          <p:nvPr>
+            <p:ph type="title"/>
+          </p:nvPr>
+        </p:nvSpPr>
+        <p:spPr/>
+        <p:txBody>
+          <a:bodyPr/>
+          <a:lstStyle/>
+          <a:p>
+            <a:pPr lvl="0" indent="0" marL="0">
+              <a:buNone/>
+            </a:pPr>
+            <a:r>
+              <a:rPr/>
+              <a:t>…</a:t>
+            </a:r>
+          </a:p>
+        </p:txBody>
+      </p:sp>
+      <mc:AlternateContent xmlns:mc="http://schemas.openxmlformats.org/markup-compatibility/2006">
+        <mc:Choice xmlns:a14="http://schemas.microsoft.com/office/drawing/2010/main" Requires="a14">
+          <p:sp>
+            <p:nvSpPr>
+              <p:cNvPr id="3" name="Content Placeholder 2"/>
+              <p:cNvSpPr>
+                <a:spLocks noGrp="1"/>
+              </p:cNvSpPr>
+              <p:nvPr>
+                <p:ph idx="1"/>
+              </p:nvPr>
+            </p:nvSpPr>
+            <p:spPr/>
+            <p:txBody>
+              <a:bodyPr/>
+              <a:lstStyle/>
+              <a:p>
+                <a:pPr lvl="0" indent="0" marL="0">
+                  <a:buNone/>
+                </a:pPr>
+                <a:r>
+                  <a:rPr/>
+                  <a:t>Proportional hazard model is the primary regression model to investigate the effectiveness of treatment </a:t>
+                </a:r>
+                <a14:m>
+                  <m:oMath xmlns:m="http://schemas.openxmlformats.org/officeDocument/2006/math">
+                    <m:r>
+                      <m:t>X</m:t>
+                    </m:r>
+                  </m:oMath>
+                </a14:m>
+                <a:r>
+                  <a:rPr/>
+                  <a:t> over survival time T, where the i-th patient at a time t</a:t>
+                </a:r>
+                <a:br/>
+                <a:r>
+                  <a:rPr/>
+                  <a:t>is</a:t>
+                </a:r>
+                <a:br/>
+                <a14:m>
+                  <m:oMath xmlns:m="http://schemas.openxmlformats.org/officeDocument/2006/math">
+                    <m:sSub>
+                      <m:e>
+                        <m:r>
+                          <m:t>h</m:t>
+                        </m:r>
+                      </m:e>
+                      <m:sub>
+                        <m:r>
+                          <m:t>i</m:t>
+                        </m:r>
+                      </m:sub>
+                    </m:sSub>
+                    <m:d>
+                      <m:dPr>
+                        <m:begChr m:val="("/>
+                        <m:endChr m:val=")"/>
+                        <m:sepChr m:val=""/>
+                        <m:grow/>
+                      </m:dPr>
+                      <m:e>
+                        <m:r>
+                          <m:t>t</m:t>
+                        </m:r>
+                      </m:e>
+                    </m:d>
+                    <m:r>
+                      <m:rPr>
+                        <m:sty m:val="p"/>
+                      </m:rPr>
+                      <m:t>=</m:t>
+                    </m:r>
+                    <m:sSub>
+                      <m:e>
+                        <m:r>
+                          <m:t>h</m:t>
+                        </m:r>
+                      </m:e>
+                      <m:sub>
+                        <m:r>
+                          <m:t>0</m:t>
+                        </m:r>
+                      </m:sub>
+                    </m:sSub>
+                    <m:d>
+                      <m:dPr>
+                        <m:begChr m:val="("/>
+                        <m:endChr m:val=")"/>
+                        <m:sepChr m:val=""/>
+                        <m:grow/>
+                      </m:dPr>
+                      <m:e>
+                        <m:r>
+                          <m:t>t</m:t>
+                        </m:r>
+                      </m:e>
+                    </m:d>
+                    <m:sSup>
+                      <m:e>
+                        <m:r>
+                          <m:t>e</m:t>
+                        </m:r>
+                      </m:e>
+                      <m:sup>
+                        <m:sSub>
+                          <m:e>
+                            <m:r>
+                              <m:t>x</m:t>
+                            </m:r>
+                          </m:e>
+                          <m:sub>
+                            <m:r>
+                              <m:t>i</m:t>
+                            </m:r>
+                          </m:sub>
+                        </m:sSub>
+                        <m:r>
+                          <m:t>β</m:t>
+                        </m:r>
+                      </m:sup>
+                    </m:sSup>
+                  </m:oMath>
+                </a14:m>
+                <a:br/>
+                <a:r>
+                  <a:rPr/>
+                  <a:t>where</a:t>
+                </a:r>
+                <a:br/>
+                <a:r>
+                  <a:rPr/>
+                  <a:t>- </a:t>
+                </a:r>
+                <a14:m>
+                  <m:oMath xmlns:m="http://schemas.openxmlformats.org/officeDocument/2006/math">
+                    <m:sSub>
+                      <m:e>
+                        <m:r>
+                          <m:t>h</m:t>
+                        </m:r>
+                      </m:e>
+                      <m:sub>
+                        <m:r>
+                          <m:t>0</m:t>
+                        </m:r>
+                      </m:sub>
+                    </m:sSub>
+                  </m:oMath>
+                </a14:m>
+                <a:r>
+                  <a:rPr/>
+                  <a:t> the baseline hazard function</a:t>
+                </a:r>
+                <a:br/>
+                <a:r>
+                  <a:rPr/>
+                  <a:t>- </a:t>
+                </a:r>
+                <a14:m>
+                  <m:oMath xmlns:m="http://schemas.openxmlformats.org/officeDocument/2006/math">
+                    <m:sSub>
+                      <m:e>
+                        <m:r>
+                          <m:t>x</m:t>
+                        </m:r>
+                      </m:e>
+                      <m:sub>
+                        <m:r>
+                          <m:t>i</m:t>
+                        </m:r>
+                      </m:sub>
+                    </m:sSub>
+                  </m:oMath>
+                </a14:m>
+                <a:r>
+                  <a:rPr/>
+                  <a:t> is the treatment indicator variable (control = 0, treatment = 1)</a:t>
+                </a:r>
+                <a:br/>
+                <a:r>
+                  <a:rPr/>
+                  <a:t>- </a:t>
+                </a:r>
+                <a14:m>
+                  <m:oMath xmlns:m="http://schemas.openxmlformats.org/officeDocument/2006/math">
+                    <m:r>
+                      <m:t>β</m:t>
+                    </m:r>
+                  </m:oMath>
+                </a14:m>
+                <a:r>
+                  <a:rPr/>
+                  <a:t> is the log hazard ratio of treatment effect</a:t>
+                </a:r>
+                <a:br/>
+              </a:p>
+              <a:p>
+                <a:pPr lvl="0" indent="0" marL="0">
+                  <a:buNone/>
+                </a:pPr>
+                <a:r>
+                  <a:rPr/>
+                  <a:t>Cumulative Hazard Function</a:t>
+                </a:r>
+                <a:br/>
+                <a14:m>
+                  <m:oMath xmlns:m="http://schemas.openxmlformats.org/officeDocument/2006/math">
+                    <m:r>
+                      <m:t>H</m:t>
+                    </m:r>
+                    <m:d>
+                      <m:dPr>
+                        <m:begChr m:val="("/>
+                        <m:endChr m:val=")"/>
+                        <m:sepChr m:val=""/>
+                        <m:grow/>
+                      </m:dPr>
+                      <m:e>
+                        <m:r>
+                          <m:t>t</m:t>
+                        </m:r>
+                      </m:e>
+                    </m:d>
+                    <m:r>
+                      <m:rPr>
+                        <m:sty m:val="p"/>
+                      </m:rPr>
+                      <m:t>=</m:t>
+                    </m:r>
+                    <m:nary>
+                      <m:naryPr>
+                        <m:chr m:val="∫"/>
+                        <m:limLoc m:val="subSup"/>
+                        <m:subHide m:val="0"/>
+                        <m:supHide m:val="0"/>
+                      </m:naryPr>
+                      <m:sub>
+                        <m:r>
+                          <m:t>t</m:t>
+                        </m:r>
+                      </m:sub>
+                      <m:sup>
+                        <m:r>
+                          <m:rPr>
+                            <m:sty m:val="p"/>
+                          </m:rPr>
+                          <m:t>∞</m:t>
+                        </m:r>
+                      </m:sup>
+                      <m:e>
+                        <m:r>
+                          <m:t>h</m:t>
+                        </m:r>
+                      </m:e>
+                    </m:nary>
+                    <m:d>
+                      <m:dPr>
+                        <m:begChr m:val="("/>
+                        <m:endChr m:val=")"/>
+                        <m:sepChr m:val=""/>
+                        <m:grow/>
+                      </m:dPr>
+                      <m:e>
+                        <m:r>
+                          <m:t>t</m:t>
+                        </m:r>
+                      </m:e>
+                    </m:d>
+                    <m:r>
+                      <m:t>d</m:t>
+                    </m:r>
+                    <m:r>
+                      <m:t>t</m:t>
+                    </m:r>
+                    <m:r>
+                      <m:rPr>
+                        <m:sty m:val="p"/>
+                      </m:rPr>
+                      <m:t>=</m:t>
+                    </m:r>
+                    <m:nary>
+                      <m:naryPr>
+                        <m:chr m:val="∫"/>
+                        <m:limLoc m:val="subSup"/>
+                        <m:subHide m:val="0"/>
+                        <m:supHide m:val="0"/>
+                      </m:naryPr>
+                      <m:sub>
+                        <m:r>
+                          <m:t>t</m:t>
+                        </m:r>
+                      </m:sub>
+                      <m:sup>
+                        <m:r>
+                          <m:rPr>
+                            <m:sty m:val="p"/>
+                          </m:rPr>
+                          <m:t>∞</m:t>
+                        </m:r>
+                      </m:sup>
+                      <m:e>
+                        <m:sSub>
+                          <m:e>
+                            <m:r>
+                              <m:t>h</m:t>
+                            </m:r>
+                          </m:e>
+                          <m:sub>
+                            <m:r>
+                              <m:t>0</m:t>
+                            </m:r>
+                          </m:sub>
+                        </m:sSub>
+                      </m:e>
+                    </m:nary>
+                    <m:d>
+                      <m:dPr>
+                        <m:begChr m:val="("/>
+                        <m:endChr m:val=")"/>
+                        <m:sepChr m:val=""/>
+                        <m:grow/>
+                      </m:dPr>
+                      <m:e>
+                        <m:r>
+                          <m:t>t</m:t>
+                        </m:r>
+                      </m:e>
+                    </m:d>
+                    <m:sSup>
+                      <m:e>
+                        <m:r>
+                          <m:t>e</m:t>
+                        </m:r>
+                      </m:e>
+                      <m:sup>
+                        <m:r>
+                          <m:t>X</m:t>
+                        </m:r>
+                        <m:r>
+                          <m:t>β</m:t>
+                        </m:r>
+                      </m:sup>
+                    </m:sSup>
+                    <m:r>
+                      <m:t>d</m:t>
+                    </m:r>
+                    <m:r>
+                      <m:t>t</m:t>
+                    </m:r>
+                    <m:r>
+                      <m:rPr>
+                        <m:sty m:val="p"/>
+                      </m:rPr>
+                      <m:t>=</m:t>
+                    </m:r>
+                    <m:sSub>
+                      <m:e>
+                        <m:r>
+                          <m:t>H</m:t>
+                        </m:r>
+                      </m:e>
+                      <m:sub>
+                        <m:r>
+                          <m:t>0</m:t>
+                        </m:r>
+                      </m:sub>
+                    </m:sSub>
+                    <m:d>
+                      <m:dPr>
+                        <m:begChr m:val="("/>
+                        <m:endChr m:val=")"/>
+                        <m:sepChr m:val=""/>
+                        <m:grow/>
+                      </m:dPr>
+                      <m:e>
+                        <m:r>
+                          <m:t>t</m:t>
+                        </m:r>
+                      </m:e>
+                    </m:d>
+                    <m:sSup>
+                      <m:e>
+                        <m:r>
+                          <m:t>e</m:t>
+                        </m:r>
+                      </m:e>
+                      <m:sup>
+                        <m:r>
+                          <m:t>X</m:t>
+                        </m:r>
+                        <m:r>
+                          <m:t>β</m:t>
+                        </m:r>
+                      </m:sup>
+                    </m:sSup>
+                  </m:oMath>
+                </a14:m>
+                <a:br/>
+                <a:r>
+                  <a:rPr/>
+                  <a:t>where</a:t>
+                </a:r>
+                <a:br/>
+                <a:r>
+                  <a:rPr/>
+                  <a:t>- </a:t>
+                </a:r>
+                <a14:m>
+                  <m:oMath xmlns:m="http://schemas.openxmlformats.org/officeDocument/2006/math">
+                    <m:sSub>
+                      <m:e>
+                        <m:r>
+                          <m:t>H</m:t>
+                        </m:r>
+                      </m:e>
+                      <m:sub>
+                        <m:r>
+                          <m:t>0</m:t>
+                        </m:r>
+                      </m:sub>
+                    </m:sSub>
+                    <m:d>
+                      <m:dPr>
+                        <m:begChr m:val="("/>
+                        <m:endChr m:val=")"/>
+                        <m:sepChr m:val=""/>
+                        <m:grow/>
+                      </m:dPr>
+                      <m:e>
+                        <m:r>
+                          <m:t>t</m:t>
+                        </m:r>
+                      </m:e>
+                    </m:d>
+                  </m:oMath>
+                </a14:m>
+                <a:r>
+                  <a:rPr/>
+                  <a:t> is the cumulative baseline risk</a:t>
+                </a:r>
+                <a:br/>
+              </a:p>
+            </p:txBody>
+          </p:sp>
+        </mc:Choice>
+      </mc:AlternateContent>
+      <p:sp>
+        <p:nvSpPr>
+          <p:cNvPr id="5" name="Footer Placeholder 4"/>
+          <p:cNvSpPr>
+            <a:spLocks noGrp="1"/>
+          </p:cNvSpPr>
+          <p:nvPr>
+            <p:ph idx="11" sz="quarter" type="ftr"/>
+          </p:nvPr>
+        </p:nvSpPr>
+        <p:spPr/>
+        <p:txBody>
+          <a:bodyPr/>
+          <a:lstStyle/>
+          <a:p>
+            <a:endParaRPr lang="en-US"/>
+          </a:p>
+        </p:txBody>
+      </p:sp>
+      <p:sp>
+        <p:nvSpPr>
+          <p:cNvPr id="6" name="Slide Number Placeholder 5"/>
+          <p:cNvSpPr>
+            <a:spLocks noGrp="1"/>
+          </p:cNvSpPr>
+          <p:nvPr>
+            <p:ph idx="12" sz="quarter" type="sldNum"/>
+          </p:nvPr>
+        </p:nvSpPr>
+        <p:spPr/>
+        <p:txBody>
+          <a:bodyPr/>
+          <a:lstStyle/>
+          <a:p>
+            <a:fld id="{C5EF2332-01BF-834F-8236-50238282D533}" type="slidenum">
+              <a:rPr lang="en-US" smtClean="0"/>
+              <a:t>‹#›</a:t>
+            </a:fld>
+            <a:endParaRPr lang="en-US"/>
+          </a:p>
+        </p:txBody>
+      </p:sp>
+    </p:spTree>
+  </p:cSld>
+</p:sld>
+</file>
+
+<file path=ppt/slides/slide5.xml><?xml version="1.0" encoding="utf-8"?>
+<p:sld xmlns:a="http://schemas.openxmlformats.org/drawingml/2006/main" xmlns:r="http://schemas.openxmlformats.org/officeDocument/2006/relationships" xmlns:p="http://schemas.openxmlformats.org/presentationml/2006/main">
+  <p:cSld>
+    <p:spTree>
+      <p:nvGrpSpPr>
+        <p:cNvPr id="1" name=""/>
+        <p:cNvGrpSpPr/>
+        <p:nvPr/>
+      </p:nvGrpSpPr>
+      <p:grpSpPr>
+        <a:xfrm>
+          <a:off x="0" y="0"/>
+          <a:ext cx="0" cy="0"/>
+          <a:chOff x="0" y="0"/>
+          <a:chExt cx="0" cy="0"/>
+        </a:xfrm>
+      </p:grpSpPr>
+      <p:sp>
+        <p:nvSpPr>
+          <p:cNvPr id="2" name="Title 1"/>
+          <p:cNvSpPr>
+            <a:spLocks noGrp="1"/>
+          </p:cNvSpPr>
+          <p:nvPr>
+            <p:ph type="title"/>
+          </p:nvPr>
+        </p:nvSpPr>
+        <p:spPr/>
+        <p:txBody>
+          <a:bodyPr/>
+          <a:lstStyle/>
+          <a:p>
+            <a:pPr lvl="0" indent="0" marL="0">
+              <a:buNone/>
+            </a:pPr>
+            <a:r>
+              <a:rPr/>
+              <a:t>…</a:t>
+            </a:r>
+          </a:p>
+        </p:txBody>
+      </p:sp>
+      <mc:AlternateContent xmlns:mc="http://schemas.openxmlformats.org/markup-compatibility/2006">
+        <mc:Choice xmlns:a14="http://schemas.microsoft.com/office/drawing/2010/main" Requires="a14">
+          <p:sp>
+            <p:nvSpPr>
+              <p:cNvPr id="3" name="Content Placeholder 2"/>
+              <p:cNvSpPr>
+                <a:spLocks noGrp="1"/>
+              </p:cNvSpPr>
+              <p:nvPr>
+                <p:ph idx="1"/>
+              </p:nvPr>
+            </p:nvSpPr>
+            <p:spPr/>
+            <p:txBody>
+              <a:bodyPr/>
+              <a:lstStyle/>
+              <a:p>
+                <a:pPr lvl="0" indent="0" marL="0">
+                  <a:buNone/>
+                </a:pPr>
+                <a:r>
+                  <a:rPr/>
+                  <a:t>The proportional hazard can be expressed as</a:t>
+                </a:r>
+                <a:br/>
+                <a:br/>
+                <a14:m>
+                  <m:oMath xmlns:m="http://schemas.openxmlformats.org/officeDocument/2006/math">
+                    <m:f>
+                      <m:fPr>
+                        <m:type m:val="bar"/>
+                      </m:fPr>
+                      <m:num>
+                        <m:r>
+                          <m:t>h</m:t>
+                        </m:r>
+                        <m:d>
+                          <m:dPr>
+                            <m:begChr m:val="("/>
+                            <m:endChr m:val=")"/>
+                            <m:sepChr m:val=""/>
+                            <m:grow/>
+                          </m:dPr>
+                          <m:e>
+                            <m:r>
+                              <m:t>t</m:t>
+                            </m:r>
+                            <m:r>
+                              <m:rPr>
+                                <m:sty m:val="p"/>
+                              </m:rPr>
+                              <m:t>|</m:t>
+                            </m:r>
+                            <m:sSub>
+                              <m:e>
+                                <m:r>
+                                  <m:t>x</m:t>
+                                </m:r>
+                              </m:e>
+                              <m:sub>
+                                <m:r>
+                                  <m:t>0</m:t>
+                                </m:r>
+                              </m:sub>
+                            </m:sSub>
+                          </m:e>
+                        </m:d>
+                      </m:num>
+                      <m:den>
+                        <m:r>
+                          <m:t>h</m:t>
+                        </m:r>
+                        <m:d>
+                          <m:dPr>
+                            <m:begChr m:val="("/>
+                            <m:endChr m:val=")"/>
+                            <m:sepChr m:val=""/>
+                            <m:grow/>
+                          </m:dPr>
+                          <m:e>
+                            <m:r>
+                              <m:t>t</m:t>
+                            </m:r>
+                            <m:r>
+                              <m:rPr>
+                                <m:sty m:val="p"/>
+                              </m:rPr>
+                              <m:t>|</m:t>
+                            </m:r>
+                            <m:sSub>
+                              <m:e>
+                                <m:r>
+                                  <m:t>x</m:t>
+                                </m:r>
+                              </m:e>
+                              <m:sub>
+                                <m:r>
+                                  <m:t>1</m:t>
+                                </m:r>
+                              </m:sub>
+                            </m:sSub>
+                          </m:e>
+                        </m:d>
+                      </m:den>
+                    </m:f>
+                    <m:r>
+                      <m:rPr>
+                        <m:sty m:val="p"/>
+                      </m:rPr>
+                      <m:t>=</m:t>
+                    </m:r>
+                    <m:sSup>
+                      <m:e>
+                        <m:r>
+                          <m:t>e</m:t>
+                        </m:r>
+                      </m:e>
+                      <m:sup>
+                        <m:r>
+                          <m:t>β</m:t>
+                        </m:r>
+                        <m:d>
+                          <m:dPr>
+                            <m:begChr m:val="("/>
+                            <m:endChr m:val=")"/>
+                            <m:sepChr m:val=""/>
+                            <m:grow/>
+                          </m:dPr>
+                          <m:e>
+                            <m:sSub>
+                              <m:e>
+                                <m:r>
+                                  <m:t>x</m:t>
+                                </m:r>
+                              </m:e>
+                              <m:sub>
+                                <m:r>
+                                  <m:t>0</m:t>
+                                </m:r>
+                              </m:sub>
+                            </m:sSub>
+                            <m:r>
+                              <m:rPr>
+                                <m:sty m:val="p"/>
+                              </m:rPr>
+                              <m:t>−</m:t>
+                            </m:r>
+                            <m:sSub>
+                              <m:e>
+                                <m:r>
+                                  <m:t>x</m:t>
+                                </m:r>
+                              </m:e>
+                              <m:sub>
+                                <m:r>
+                                  <m:t>1</m:t>
+                                </m:r>
+                              </m:sub>
+                            </m:sSub>
+                          </m:e>
+                        </m:d>
+                      </m:sup>
+                    </m:sSup>
+                  </m:oMath>
+                </a14:m>
+                <a:br/>
+              </a:p>
+              <a:p>
+                <a:pPr lvl="0" indent="0" marL="0">
+                  <a:buNone/>
+                </a:pPr>
+                <a:r>
+                  <a:rPr/>
+                  <a:t>Derive survival time T</a:t>
+                </a:r>
+                <a:br/>
+                <a:br/>
+                <a14:m>
+                  <m:oMath xmlns:m="http://schemas.openxmlformats.org/officeDocument/2006/math">
+                    <m:r>
+                      <m:t>H</m:t>
+                    </m:r>
+                    <m:d>
+                      <m:dPr>
+                        <m:begChr m:val="("/>
+                        <m:endChr m:val=")"/>
+                        <m:sepChr m:val=""/>
+                        <m:grow/>
+                      </m:dPr>
+                      <m:e>
+                        <m:r>
+                          <m:t>t</m:t>
+                        </m:r>
+                      </m:e>
+                    </m:d>
+                    <m:r>
+                      <m:rPr>
+                        <m:sty m:val="p"/>
+                      </m:rPr>
+                      <m:t>=</m:t>
+                    </m:r>
+                    <m:r>
+                      <m:rPr>
+                        <m:sty m:val="p"/>
+                      </m:rPr>
+                      <m:t>−</m:t>
+                    </m:r>
+                    <m:r>
+                      <m:rPr>
+                        <m:sty m:val="p"/>
+                      </m:rPr>
+                      <m:t>log</m:t>
+                    </m:r>
+                    <m:d>
+                      <m:dPr>
+                        <m:begChr m:val="("/>
+                        <m:endChr m:val=")"/>
+                        <m:sepChr m:val=""/>
+                        <m:grow/>
+                      </m:dPr>
+                      <m:e>
+                        <m:r>
+                          <m:t>S</m:t>
+                        </m:r>
+                        <m:d>
+                          <m:dPr>
+                            <m:begChr m:val="("/>
+                            <m:endChr m:val=")"/>
+                            <m:sepChr m:val=""/>
+                            <m:grow/>
+                          </m:dPr>
+                          <m:e>
+                            <m:r>
+                              <m:t>t</m:t>
+                            </m:r>
+                          </m:e>
+                        </m:d>
+                      </m:e>
+                    </m:d>
+                  </m:oMath>
+                </a14:m>
+                <a:br/>
+                <a14:m>
+                  <m:oMath xmlns:m="http://schemas.openxmlformats.org/officeDocument/2006/math">
+                    <m:r>
+                      <m:t>S</m:t>
+                    </m:r>
+                    <m:d>
+                      <m:dPr>
+                        <m:begChr m:val="("/>
+                        <m:endChr m:val=")"/>
+                        <m:sepChr m:val=""/>
+                        <m:grow/>
+                      </m:dPr>
+                      <m:e>
+                        <m:r>
+                          <m:t>t</m:t>
+                        </m:r>
+                      </m:e>
+                    </m:d>
+                    <m:r>
+                      <m:rPr>
+                        <m:sty m:val="p"/>
+                      </m:rPr>
+                      <m:t>=</m:t>
+                    </m:r>
+                    <m:sSup>
+                      <m:e>
+                        <m:r>
+                          <m:t>e</m:t>
+                        </m:r>
+                      </m:e>
+                      <m:sup>
+                        <m:r>
+                          <m:rPr>
+                            <m:sty m:val="p"/>
+                          </m:rPr>
+                          <m:t>−</m:t>
+                        </m:r>
+                        <m:r>
+                          <m:t>H</m:t>
+                        </m:r>
+                        <m:d>
+                          <m:dPr>
+                            <m:begChr m:val="("/>
+                            <m:endChr m:val=")"/>
+                            <m:sepChr m:val=""/>
+                            <m:grow/>
+                          </m:dPr>
+                          <m:e>
+                            <m:r>
+                              <m:t>t</m:t>
+                            </m:r>
+                          </m:e>
+                        </m:d>
+                      </m:sup>
+                    </m:sSup>
+                    <m:r>
+                      <m:rPr>
+                        <m:sty m:val="p"/>
+                      </m:rPr>
+                      <m:t>=</m:t>
+                    </m:r>
+                    <m:sSup>
+                      <m:e>
+                        <m:r>
+                          <m:t>e</m:t>
+                        </m:r>
+                      </m:e>
+                      <m:sup>
+                        <m:nary>
+                          <m:naryPr>
+                            <m:chr m:val="∫"/>
+                            <m:limLoc m:val="subSup"/>
+                            <m:subHide m:val="0"/>
+                            <m:supHide m:val="0"/>
+                          </m:naryPr>
+                          <m:sub>
+                            <m:r>
+                              <m:t>t</m:t>
+                            </m:r>
+                          </m:sub>
+                          <m:sup>
+                            <m:r>
+                              <m:rPr>
+                                <m:sty m:val="p"/>
+                              </m:rPr>
+                              <m:t>∞</m:t>
+                            </m:r>
+                          </m:sup>
+                          <m:e>
+                            <m:r>
+                              <m:t>h</m:t>
+                            </m:r>
+                          </m:e>
+                        </m:nary>
+                        <m:d>
+                          <m:dPr>
+                            <m:begChr m:val="("/>
+                            <m:endChr m:val=")"/>
+                            <m:sepChr m:val=""/>
+                            <m:grow/>
+                          </m:dPr>
+                          <m:e>
+                            <m:r>
+                              <m:t>s</m:t>
+                            </m:r>
+                          </m:e>
+                        </m:d>
+                        <m:r>
+                          <m:t>d</m:t>
+                        </m:r>
+                        <m:r>
+                          <m:t>s</m:t>
+                        </m:r>
+                      </m:sup>
+                    </m:sSup>
+                  </m:oMath>
+                </a14:m>
+                <a:br/>
+              </a:p>
+              <a:p>
+                <a:pPr lvl="0" indent="0" marL="0">
+                  <a:buNone/>
+                </a:pPr>
+                <a:r>
+                  <a:rPr/>
+                  <a:t>By Inverse Transformation Method</a:t>
+                </a:r>
+                <a:br/>
+              </a:p>
+              <a:p>
+                <a:pPr lvl="0" indent="0" marL="0">
+                  <a:buNone/>
+                </a:pPr>
+                <a14:m>
+                  <m:oMath xmlns:m="http://schemas.openxmlformats.org/officeDocument/2006/math">
+                    <m:r>
+                      <m:t>T</m:t>
+                    </m:r>
+                    <m:r>
+                      <m:rPr>
+                        <m:sty m:val="p"/>
+                      </m:rPr>
+                      <m:t>=</m:t>
+                    </m:r>
+                    <m:sSup>
+                      <m:e>
+                        <m:r>
+                          <m:t>F</m:t>
+                        </m:r>
+                      </m:e>
+                      <m:sup>
+                        <m:r>
+                          <m:rPr>
+                            <m:sty m:val="p"/>
+                          </m:rPr>
+                          <m:t>−</m:t>
+                        </m:r>
+                        <m:r>
+                          <m:t>1</m:t>
+                        </m:r>
+                      </m:sup>
+                    </m:sSup>
+                    <m:d>
+                      <m:dPr>
+                        <m:begChr m:val="("/>
+                        <m:endChr m:val=")"/>
+                        <m:sepChr m:val=""/>
+                        <m:grow/>
+                      </m:dPr>
+                      <m:e>
+                        <m:r>
+                          <m:t>U</m:t>
+                        </m:r>
+                      </m:e>
+                    </m:d>
+                    <m:r>
+                      <m:rPr>
+                        <m:sty m:val="p"/>
+                      </m:rPr>
+                      <m:t>=</m:t>
+                    </m:r>
+                    <m:sSubSup>
+                      <m:e>
+                        <m:r>
+                          <m:t>H</m:t>
+                        </m:r>
+                      </m:e>
+                      <m:sub>
+                        <m:r>
+                          <m:t>0</m:t>
+                        </m:r>
+                      </m:sub>
+                      <m:sup>
+                        <m:r>
+                          <m:rPr>
+                            <m:sty m:val="p"/>
+                          </m:rPr>
+                          <m:t>−</m:t>
+                        </m:r>
+                        <m:r>
+                          <m:t>1</m:t>
+                        </m:r>
+                      </m:sup>
+                    </m:sSubSup>
+                    <m:d>
+                      <m:dPr>
+                        <m:begChr m:val="("/>
+                        <m:endChr m:val=")"/>
+                        <m:sepChr m:val=""/>
+                        <m:grow/>
+                      </m:dPr>
+                      <m:e>
+                        <m:f>
+                          <m:fPr>
+                            <m:type m:val="bar"/>
+                          </m:fPr>
+                          <m:num>
+                            <m:r>
+                              <m:rPr>
+                                <m:sty m:val="p"/>
+                              </m:rPr>
+                              <m:t>−</m:t>
+                            </m:r>
+                            <m:r>
+                              <m:rPr>
+                                <m:sty m:val="p"/>
+                              </m:rPr>
+                              <m:t>log</m:t>
+                            </m:r>
+                            <m:d>
+                              <m:dPr>
+                                <m:begChr m:val="("/>
+                                <m:endChr m:val=")"/>
+                                <m:sepChr m:val=""/>
+                                <m:grow/>
+                              </m:dPr>
+                              <m:e>
+                                <m:r>
+                                  <m:t>U</m:t>
+                                </m:r>
+                              </m:e>
+                            </m:d>
+                          </m:num>
+                          <m:den>
+                            <m:sSup>
+                              <m:e>
+                                <m:r>
+                                  <m:t>e</m:t>
+                                </m:r>
+                              </m:e>
+                              <m:sup>
+                                <m:r>
+                                  <m:t>X</m:t>
+                                </m:r>
+                                <m:r>
+                                  <m:t>β</m:t>
+                                </m:r>
+                              </m:sup>
+                            </m:sSup>
+                          </m:den>
+                        </m:f>
+                      </m:e>
+                    </m:d>
+                  </m:oMath>
+                </a14:m>
+                <a:br/>
+                <a:r>
+                  <a:rPr/>
+                  <a:t>where </a:t>
+                </a:r>
+                <a14:m>
+                  <m:oMath xmlns:m="http://schemas.openxmlformats.org/officeDocument/2006/math">
+                    <m:r>
+                      <m:t>U</m:t>
+                    </m:r>
+                    <m:r>
+                      <m:rPr>
+                        <m:sty m:val="p"/>
+                      </m:rPr>
+                      <m:t>∼</m:t>
+                    </m:r>
+                    <m:r>
+                      <m:t>U</m:t>
+                    </m:r>
+                    <m:d>
+                      <m:dPr>
+                        <m:begChr m:val="("/>
+                        <m:endChr m:val=")"/>
+                        <m:sepChr m:val=""/>
+                        <m:grow/>
+                      </m:dPr>
+                      <m:e>
+                        <m:r>
+                          <m:t>0</m:t>
+                        </m:r>
+                        <m:r>
+                          <m:rPr>
+                            <m:sty m:val="p"/>
+                          </m:rPr>
+                          <m:t>,</m:t>
+                        </m:r>
+                        <m:r>
+                          <m:t>1</m:t>
+                        </m:r>
+                      </m:e>
+                    </m:d>
+                  </m:oMath>
+                </a14:m>
+                <a:br/>
+              </a:p>
+            </p:txBody>
+          </p:sp>
+        </mc:Choice>
+      </mc:AlternateContent>
+      <p:sp>
+        <p:nvSpPr>
+          <p:cNvPr id="5" name="Footer Placeholder 4"/>
+          <p:cNvSpPr>
+            <a:spLocks noGrp="1"/>
+          </p:cNvSpPr>
+          <p:nvPr>
+            <p:ph idx="11" sz="quarter" type="ftr"/>
+          </p:nvPr>
+        </p:nvSpPr>
+        <p:spPr/>
+        <p:txBody>
+          <a:bodyPr/>
+          <a:lstStyle/>
+          <a:p>
+            <a:endParaRPr lang="en-US"/>
+          </a:p>
+        </p:txBody>
+      </p:sp>
+      <p:sp>
+        <p:nvSpPr>
+          <p:cNvPr id="6" name="Slide Number Placeholder 5"/>
+          <p:cNvSpPr>
+            <a:spLocks noGrp="1"/>
+          </p:cNvSpPr>
+          <p:nvPr>
+            <p:ph idx="12" sz="quarter" type="sldNum"/>
+          </p:nvPr>
+        </p:nvSpPr>
+        <p:spPr/>
+        <p:txBody>
+          <a:bodyPr/>
+          <a:lstStyle/>
+          <a:p>
+            <a:fld id="{C5EF2332-01BF-834F-8236-50238282D533}" type="slidenum">
+              <a:rPr lang="en-US" smtClean="0"/>
+              <a:t>‹#›</a:t>
+            </a:fld>
+            <a:endParaRPr lang="en-US"/>
+          </a:p>
+        </p:txBody>
+      </p:sp>
+    </p:spTree>
+  </p:cSld>
+</p:sld>
+</file>
+
+<file path=ppt/slides/slide6.xml><?xml version="1.0" encoding="utf-8"?>
+<p:sld xmlns:a="http://schemas.openxmlformats.org/drawingml/2006/main" xmlns:r="http://schemas.openxmlformats.org/officeDocument/2006/relationships" xmlns:p="http://schemas.openxmlformats.org/presentationml/2006/main">
+  <p:cSld>
+    <p:spTree>
+      <p:nvGrpSpPr>
+        <p:cNvPr id="1" name=""/>
+        <p:cNvGrpSpPr/>
+        <p:nvPr/>
+      </p:nvGrpSpPr>
+      <p:grpSpPr>
+        <a:xfrm>
+          <a:off x="0" y="0"/>
+          <a:ext cx="0" cy="0"/>
+          <a:chOff x="0" y="0"/>
+          <a:chExt cx="0" cy="0"/>
+        </a:xfrm>
+      </p:grpSpPr>
+      <p:sp>
+        <p:nvSpPr>
+          <p:cNvPr id="2" name="Title 1"/>
+          <p:cNvSpPr>
+            <a:spLocks noGrp="1"/>
+          </p:cNvSpPr>
+          <p:nvPr>
+            <p:ph type="title"/>
+          </p:nvPr>
+        </p:nvSpPr>
+        <p:spPr/>
+        <p:txBody>
+          <a:bodyPr/>
+          <a:lstStyle/>
+          <a:p>
+            <a:pPr lvl="0" indent="0" marL="0">
+              <a:buNone/>
+            </a:pPr>
+            <a:r>
+              <a:rPr/>
+              <a:t>…</a:t>
+            </a:r>
+          </a:p>
+        </p:txBody>
+      </p:sp>
+      <mc:AlternateContent xmlns:mc="http://schemas.openxmlformats.org/markup-compatibility/2006">
+        <mc:Choice xmlns:a14="http://schemas.microsoft.com/office/drawing/2010/main" Requires="a14">
+          <p:sp>
+            <p:nvSpPr>
+              <p:cNvPr id="3" name="Content Placeholder 2"/>
+              <p:cNvSpPr>
+                <a:spLocks noGrp="1"/>
+              </p:cNvSpPr>
+              <p:nvPr>
+                <p:ph idx="1"/>
+              </p:nvPr>
+            </p:nvSpPr>
+            <p:spPr/>
+            <p:txBody>
+              <a:bodyPr/>
+              <a:lstStyle/>
+              <a:p>
+                <a:pPr lvl="0" indent="0" marL="0">
+                  <a:buNone/>
+                </a:pPr>
+                <a14:m>
+                  <m:oMath xmlns:m="http://schemas.openxmlformats.org/officeDocument/2006/math">
+                    <m:r>
+                      <m:t>T</m:t>
+                    </m:r>
+                    <m:r>
+                      <m:rPr>
+                        <m:sty m:val="p"/>
+                      </m:rPr>
+                      <m:t>=</m:t>
+                    </m:r>
+                    <m:sSup>
+                      <m:e>
+                        <m:r>
+                          <m:t>F</m:t>
+                        </m:r>
+                      </m:e>
+                      <m:sup>
+                        <m:r>
+                          <m:rPr>
+                            <m:sty m:val="p"/>
+                          </m:rPr>
+                          <m:t>−</m:t>
+                        </m:r>
+                        <m:r>
+                          <m:t>1</m:t>
+                        </m:r>
+                      </m:sup>
+                    </m:sSup>
+                    <m:d>
+                      <m:dPr>
+                        <m:begChr m:val="("/>
+                        <m:endChr m:val=")"/>
+                        <m:sepChr m:val=""/>
+                        <m:grow/>
+                      </m:dPr>
+                      <m:e>
+                        <m:r>
+                          <m:t>U</m:t>
+                        </m:r>
+                      </m:e>
+                    </m:d>
+                    <m:r>
+                      <m:rPr>
+                        <m:sty m:val="p"/>
+                      </m:rPr>
+                      <m:t>=</m:t>
+                    </m:r>
+                    <m:sSubSup>
+                      <m:e>
+                        <m:r>
+                          <m:t>H</m:t>
+                        </m:r>
+                      </m:e>
+                      <m:sub>
+                        <m:r>
+                          <m:t>0</m:t>
+                        </m:r>
+                      </m:sub>
+                      <m:sup>
+                        <m:r>
+                          <m:rPr>
+                            <m:sty m:val="p"/>
+                          </m:rPr>
+                          <m:t>−</m:t>
+                        </m:r>
+                        <m:r>
+                          <m:t>1</m:t>
+                        </m:r>
+                      </m:sup>
+                    </m:sSubSup>
+                    <m:d>
+                      <m:dPr>
+                        <m:begChr m:val="("/>
+                        <m:endChr m:val=")"/>
+                        <m:sepChr m:val=""/>
+                        <m:grow/>
+                      </m:dPr>
+                      <m:e>
+                        <m:f>
+                          <m:fPr>
+                            <m:type m:val="bar"/>
+                          </m:fPr>
+                          <m:num>
+                            <m:r>
+                              <m:rPr>
+                                <m:sty m:val="p"/>
+                              </m:rPr>
+                              <m:t>−</m:t>
+                            </m:r>
+                            <m:r>
+                              <m:rPr>
+                                <m:sty m:val="p"/>
+                              </m:rPr>
+                              <m:t>log</m:t>
+                            </m:r>
+                            <m:d>
+                              <m:dPr>
+                                <m:begChr m:val="("/>
+                                <m:endChr m:val=")"/>
+                                <m:sepChr m:val=""/>
+                                <m:grow/>
+                              </m:dPr>
+                              <m:e>
+                                <m:r>
+                                  <m:t>U</m:t>
+                                </m:r>
+                              </m:e>
+                            </m:d>
+                          </m:num>
+                          <m:den>
+                            <m:sSup>
+                              <m:e>
+                                <m:r>
+                                  <m:t>e</m:t>
+                                </m:r>
+                              </m:e>
+                              <m:sup>
+                                <m:r>
+                                  <m:t>X</m:t>
+                                </m:r>
+                                <m:r>
+                                  <m:t>β</m:t>
+                                </m:r>
+                              </m:sup>
+                            </m:sSup>
+                          </m:den>
+                        </m:f>
+                      </m:e>
+                    </m:d>
+                  </m:oMath>
+                </a14:m>
+                <a:br/>
+                <a:r>
+                  <a:rPr/>
+                  <a:t>where </a:t>
+                </a:r>
+                <a14:m>
+                  <m:oMath xmlns:m="http://schemas.openxmlformats.org/officeDocument/2006/math">
+                    <m:r>
+                      <m:t>U</m:t>
+                    </m:r>
+                    <m:r>
+                      <m:rPr>
+                        <m:sty m:val="p"/>
+                      </m:rPr>
+                      <m:t>∼</m:t>
+                    </m:r>
+                    <m:r>
+                      <m:t>U</m:t>
+                    </m:r>
+                    <m:d>
+                      <m:dPr>
+                        <m:begChr m:val="("/>
+                        <m:endChr m:val=")"/>
+                        <m:sepChr m:val=""/>
+                        <m:grow/>
+                      </m:dPr>
+                      <m:e>
+                        <m:r>
+                          <m:t>0</m:t>
+                        </m:r>
+                        <m:r>
+                          <m:rPr>
+                            <m:sty m:val="p"/>
+                          </m:rPr>
+                          <m:t>,</m:t>
+                        </m:r>
+                        <m:r>
+                          <m:t>1</m:t>
+                        </m:r>
+                      </m:e>
+                    </m:d>
+                  </m:oMath>
+                </a14:m>
+                <a:br/>
+                <a:br/>
+                <a:r>
+                  <a:rPr/>
+                  <a:t>In our simulation, we will consider three types of data:</a:t>
+                </a:r>
+                <a:br/>
+                <a:r>
+                  <a:rPr/>
+                  <a:t>Exponential, Weibull, and Gompertz</a:t>
+                </a:r>
+                <a:br/>
+              </a:p>
+              <a:p>
+                <a:pPr lvl="0" indent="0" marL="0">
+                  <a:buNone/>
+                </a:pPr>
+                <a:r>
+                  <a:rPr/>
+                  <a:t>Apply Inverse transformation method, obtain the following table</a:t>
+                </a:r>
+                <a:br/>
+              </a:p>
+            </p:txBody>
+          </p:sp>
+        </mc:Choice>
+      </mc:AlternateContent>
+      <p:sp>
+        <p:nvSpPr>
+          <p:cNvPr id="5" name="Footer Placeholder 4"/>
+          <p:cNvSpPr>
+            <a:spLocks noGrp="1"/>
+          </p:cNvSpPr>
+          <p:nvPr>
+            <p:ph idx="11" sz="quarter" type="ftr"/>
+          </p:nvPr>
+        </p:nvSpPr>
+        <p:spPr/>
+        <p:txBody>
+          <a:bodyPr/>
+          <a:lstStyle/>
+          <a:p>
+            <a:endParaRPr lang="en-US"/>
+          </a:p>
+        </p:txBody>
+      </p:sp>
+      <p:sp>
+        <p:nvSpPr>
+          <p:cNvPr id="6" name="Slide Number Placeholder 5"/>
+          <p:cNvSpPr>
+            <a:spLocks noGrp="1"/>
+          </p:cNvSpPr>
+          <p:nvPr>
+            <p:ph idx="12" sz="quarter" type="sldNum"/>
+          </p:nvPr>
+        </p:nvSpPr>
+        <p:spPr/>
+        <p:txBody>
+          <a:bodyPr/>
+          <a:lstStyle/>
+          <a:p>
+            <a:fld id="{C5EF2332-01BF-834F-8236-50238282D533}" type="slidenum">
+              <a:rPr lang="en-US" smtClean="0"/>
+              <a:t>‹#›</a:t>
+            </a:fld>
+            <a:endParaRPr lang="en-US"/>
+          </a:p>
+        </p:txBody>
+      </p:sp>
+    </p:spTree>
+  </p:cSld>
+</p:sld>
+</file>
+
+<file path=ppt/slides/slide7.xml><?xml version="1.0" encoding="utf-8"?>
+<p:sld xmlns:a="http://schemas.openxmlformats.org/drawingml/2006/main" xmlns:r="http://schemas.openxmlformats.org/officeDocument/2006/relationships" xmlns:p="http://schemas.openxmlformats.org/presentationml/2006/main">
+  <p:cSld>
+    <p:spTree>
+      <p:nvGrpSpPr>
+        <p:cNvPr id="1" name=""/>
+        <p:cNvGrpSpPr/>
+        <p:nvPr/>
+      </p:nvGrpSpPr>
+      <p:grpSpPr>
+        <a:xfrm>
+          <a:off x="0" y="0"/>
+          <a:ext cx="0" cy="0"/>
+          <a:chOff x="0" y="0"/>
+          <a:chExt cx="0" cy="0"/>
+        </a:xfrm>
+      </p:grpSpPr>
+      <p:sp>
+        <p:nvSpPr>
+          <p:cNvPr id="2" name="Title 1"/>
+          <p:cNvSpPr>
+            <a:spLocks noGrp="1"/>
+          </p:cNvSpPr>
+          <p:nvPr>
+            <p:ph type="title"/>
+          </p:nvPr>
+        </p:nvSpPr>
+        <p:spPr/>
+        <p:txBody>
+          <a:bodyPr/>
+          <a:lstStyle/>
+          <a:p>
+            <a:pPr lvl="0" indent="0" marL="0">
+              <a:buNone/>
+            </a:pPr>
+            <a:r>
+              <a:rPr/>
+              <a:t>…</a:t>
+            </a:r>
+          </a:p>
+        </p:txBody>
+      </p:sp>
+      <mc:AlternateContent xmlns:mc="http://schemas.openxmlformats.org/markup-compatibility/2006">
+        <mc:Choice xmlns:a14="http://schemas.microsoft.com/office/drawing/2010/main" Requires="a14">
+          <p:sp>
+            <p:nvSpPr>
+              <p:cNvPr id="3" name="Content Placeholder 2"/>
+              <p:cNvSpPr>
+                <a:spLocks noGrp="1"/>
+              </p:cNvSpPr>
+              <p:nvPr>
+                <p:ph idx="1"/>
+              </p:nvPr>
+            </p:nvSpPr>
+            <p:spPr/>
+            <p:txBody>
+              <a:bodyPr/>
+              <a:lstStyle/>
+              <a:p>
+                <a:pPr lvl="0" indent="0" marL="0">
+                  <a:buNone/>
+                </a:pPr>
+                <a:r>
+                  <a:rPr b="1"/>
+                  <a:t>Generate data</a:t>
+                </a:r>
+                <a:br/>
+                <a:r>
+                  <a:rPr/>
+                  <a:t>1. Define Random Variable </a:t>
+                </a:r>
+                <a14:m>
+                  <m:oMath xmlns:m="http://schemas.openxmlformats.org/officeDocument/2006/math">
+                    <m:r>
+                      <m:t>X</m:t>
+                    </m:r>
+                  </m:oMath>
+                </a14:m>
+                <a:r>
+                  <a:rPr/>
+                  <a:t>, treatment, from a binomial distribution with </a:t>
+                </a:r>
+                <a14:m>
+                  <m:oMath xmlns:m="http://schemas.openxmlformats.org/officeDocument/2006/math">
+                    <m:r>
+                      <m:t>p</m:t>
+                    </m:r>
+                    <m:r>
+                      <m:rPr>
+                        <m:sty m:val="p"/>
+                      </m:rPr>
+                      <m:t>=</m:t>
+                    </m:r>
+                    <m:r>
+                      <m:t>0.5</m:t>
+                    </m:r>
+                  </m:oMath>
+                </a14:m>
+                <a:br/>
+                <a:r>
+                  <a:rPr/>
+                  <a:t>2. Generate survival time </a:t>
+                </a:r>
+                <a14:m>
+                  <m:oMath xmlns:m="http://schemas.openxmlformats.org/officeDocument/2006/math">
+                    <m:r>
+                      <m:t>T</m:t>
+                    </m:r>
+                  </m:oMath>
+                </a14:m>
+                <a:r>
+                  <a:rPr/>
+                  <a:t>, time to event, using </a:t>
+                </a:r>
+                <a14:m>
+                  <m:oMath xmlns:m="http://schemas.openxmlformats.org/officeDocument/2006/math">
+                    <m:r>
+                      <m:t>X</m:t>
+                    </m:r>
+                  </m:oMath>
+                </a14:m>
+                <a:r>
+                  <a:rPr/>
+                  <a:t> and </a:t>
+                </a:r>
+                <a14:m>
+                  <m:oMath xmlns:m="http://schemas.openxmlformats.org/officeDocument/2006/math">
+                    <m:r>
+                      <m:t>β</m:t>
+                    </m:r>
+                  </m:oMath>
+                </a14:m>
+                <a:br/>
+                <a:r>
+                  <a:rPr/>
+                  <a:t>3. Randomly generate censoring time </a:t>
+                </a:r>
+                <a14:m>
+                  <m:oMath xmlns:m="http://schemas.openxmlformats.org/officeDocument/2006/math">
+                    <m:r>
+                      <m:t>C</m:t>
+                    </m:r>
+                  </m:oMath>
+                </a14:m>
+                <a:r>
+                  <a:rPr/>
+                  <a:t>, from an exponential distribution</a:t>
+                </a:r>
+                <a:br/>
+                <a:r>
+                  <a:rPr/>
+                  <a:t>4. We observe either the survival time T or else the censoring time C.</a:t>
+                </a:r>
+                <a:br/>
+                <a:r>
+                  <a:rPr/>
+                  <a:t>Specifically, we observe the random variable</a:t>
+                </a:r>
+                <a:br/>
+                <a14:m>
+                  <m:oMath xmlns:m="http://schemas.openxmlformats.org/officeDocument/2006/math">
+                    <m:r>
+                      <m:t>Y</m:t>
+                    </m:r>
+                    <m:r>
+                      <m:rPr>
+                        <m:sty m:val="p"/>
+                      </m:rPr>
+                      <m:t>=</m:t>
+                    </m:r>
+                    <m:r>
+                      <m:t>m</m:t>
+                    </m:r>
+                    <m:r>
+                      <m:t>i</m:t>
+                    </m:r>
+                    <m:r>
+                      <m:t>n</m:t>
+                    </m:r>
+                    <m:d>
+                      <m:dPr>
+                        <m:begChr m:val="("/>
+                        <m:endChr m:val=")"/>
+                        <m:sepChr m:val=""/>
+                        <m:grow/>
+                      </m:dPr>
+                      <m:e>
+                        <m:r>
+                          <m:t>T</m:t>
+                        </m:r>
+                        <m:r>
+                          <m:rPr>
+                            <m:sty m:val="p"/>
+                          </m:rPr>
+                          <m:t>,</m:t>
+                        </m:r>
+                        <m:r>
+                          <m:t>C</m:t>
+                        </m:r>
+                      </m:e>
+                    </m:d>
+                  </m:oMath>
+                </a14:m>
+                <a:br/>
+                <a:r>
+                  <a:rPr/>
+                  <a:t>Create a status indicator variable (1 = event, 0 = censored)</a:t>
+                </a:r>
+                <a:br/>
+              </a:p>
+              <a:p>
+                <a:pPr lvl="0" indent="0" marL="0">
+                  <a:buNone/>
+                </a:pPr>
+                <a14:m>
+                  <m:oMathPara xmlns:m="http://schemas.openxmlformats.org/officeDocument/2006/math">
+                    <m:oMathParaPr>
+                      <m:jc m:val="center"/>
+                    </m:oMathParaPr>
+                    <m:oMath>
+                      <m:r>
+                        <m:t>S</m:t>
+                      </m:r>
+                      <m:r>
+                        <m:t>t</m:t>
+                      </m:r>
+                      <m:r>
+                        <m:t>a</m:t>
+                      </m:r>
+                      <m:r>
+                        <m:t>t</m:t>
+                      </m:r>
+                      <m:r>
+                        <m:t>u</m:t>
+                      </m:r>
+                      <m:r>
+                        <m:t>s</m:t>
+                      </m:r>
+                      <m:r>
+                        <m:rPr>
+                          <m:sty m:val="p"/>
+                        </m:rPr>
+                        <m:t>=</m:t>
+                      </m:r>
+                      <m:d>
+                        <m:dPr>
+                          <m:begChr m:val="{"/>
+                          <m:endChr m:val=""/>
+                          <m:sepChr m:val=""/>
+                          <m:grow/>
+                        </m:dPr>
+                        <m:e>
+                          <m:m>
+                            <m:mPr>
+                              <m:baseJc m:val="center"/>
+                              <m:plcHide m:val="1"/>
+                              <m:mcs>
+                                <m:mc>
+                                  <m:mcPr>
+                                    <m:mcJc m:val="left"/>
+                                    <m:count m:val="1"/>
+                                  </m:mcPr>
+                                </m:mc>
+                                <m:mc>
+                                  <m:mcPr>
+                                    <m:mcJc m:val="left"/>
+                                    <m:count m:val="1"/>
+                                  </m:mcPr>
+                                </m:mc>
+                              </m:mcs>
+                            </m:mPr>
+                            <m:mr>
+                              <m:e>
+                                <m:r>
+                                  <m:t>1</m:t>
+                                </m:r>
+                                <m:r>
+                                  <m:rPr>
+                                    <m:sty m:val="p"/>
+                                  </m:rPr>
+                                  <m:t>,</m:t>
+                                </m:r>
+                              </m:e>
+                              <m:e>
+                                <m:sSub>
+                                  <m:e>
+                                    <m:r>
+                                      <m:t>T</m:t>
+                                    </m:r>
+                                  </m:e>
+                                  <m:sub>
+                                    <m:r>
+                                      <m:t>i</m:t>
+                                    </m:r>
+                                  </m:sub>
+                                </m:sSub>
+                                <m:r>
+                                  <m:rPr>
+                                    <m:sty m:val="p"/>
+                                  </m:rPr>
+                                  <m:t>≤</m:t>
+                                </m:r>
+                                <m:sSub>
+                                  <m:e>
+                                    <m:r>
+                                      <m:t>C</m:t>
+                                    </m:r>
+                                  </m:e>
+                                  <m:sub>
+                                    <m:r>
+                                      <m:t>i</m:t>
+                                    </m:r>
+                                  </m:sub>
+                                </m:sSub>
+                              </m:e>
+                            </m:mr>
+                            <m:mr>
+                              <m:e>
+                                <m:r>
+                                  <m:t>0</m:t>
+                                </m:r>
+                                <m:r>
+                                  <m:rPr>
+                                    <m:sty m:val="p"/>
+                                  </m:rPr>
+                                  <m:t>,</m:t>
+                                </m:r>
+                              </m:e>
+                              <m:e>
+                                <m:sSub>
+                                  <m:e>
+                                    <m:r>
+                                      <m:t>T</m:t>
+                                    </m:r>
+                                  </m:e>
+                                  <m:sub>
+                                    <m:r>
+                                      <m:t>i</m:t>
+                                    </m:r>
+                                  </m:sub>
+                                </m:sSub>
+                                <m:r>
+                                  <m:rPr>
+                                    <m:sty m:val="p"/>
+                                  </m:rPr>
+                                  <m:t>&gt;</m:t>
+                                </m:r>
+                                <m:sSub>
+                                  <m:e>
+                                    <m:r>
+                                      <m:t>C</m:t>
+                                    </m:r>
+                                  </m:e>
+                                  <m:sub>
+                                    <m:r>
+                                      <m:t>i</m:t>
+                                    </m:r>
+                                  </m:sub>
+                                </m:sSub>
+                              </m:e>
+                            </m:mr>
+                          </m:m>
+                        </m:e>
+                      </m:d>
+                    </m:oMath>
+                  </m:oMathPara>
+                </a14:m>
+              </a:p>
+              <a:p>
+                <a:pPr lvl="0" indent="0" marL="0">
+                  <a:buNone/>
+                </a:pPr>
+                <a:br/>
+                <a:r>
+                  <a:rPr b="1"/>
+                  <a:t>Define true treatment effect and parameter </a:t>
+                </a:r>
+                <a:br/>
+                <a:r>
+                  <a:rPr/>
+                  <a:t>1. True treatment effect </a:t>
+                </a:r>
+                <a14:m>
+                  <m:oMath xmlns:m="http://schemas.openxmlformats.org/officeDocument/2006/math">
+                    <m:r>
+                      <m:t>β</m:t>
+                    </m:r>
+                    <m:r>
+                      <m:rPr>
+                        <m:sty m:val="p"/>
+                      </m:rPr>
+                      <m:t>=</m:t>
+                    </m:r>
+                    <m:r>
+                      <m:t>2</m:t>
+                    </m:r>
+                  </m:oMath>
+                </a14:m>
+                <a:br/>
+                <a:r>
+                  <a:rPr/>
+                  <a:t>2. 7 different sample size N ranging from 100 to 400 increasing by 50</a:t>
+                </a:r>
+                <a:br/>
+                <a:r>
+                  <a:rPr/>
+                  <a:t>3. Simulate exponential distribution with </a:t>
+                </a:r>
+                <a14:m>
+                  <m:oMath xmlns:m="http://schemas.openxmlformats.org/officeDocument/2006/math">
+                    <m:r>
+                      <m:t>λ</m:t>
+                    </m:r>
+                    <m:r>
+                      <m:rPr>
+                        <m:sty m:val="p"/>
+                      </m:rPr>
+                      <m:t>=</m:t>
+                    </m:r>
+                    <m:r>
+                      <m:t>0.5</m:t>
+                    </m:r>
+                  </m:oMath>
+                </a14:m>
+                <a:br/>
+                <a:r>
+                  <a:rPr/>
+                  <a:t>4. Simulate weibull distribution with </a:t>
+                </a:r>
+                <a14:m>
+                  <m:oMath xmlns:m="http://schemas.openxmlformats.org/officeDocument/2006/math">
+                    <m:r>
+                      <m:t>λ</m:t>
+                    </m:r>
+                    <m:r>
+                      <m:rPr>
+                        <m:sty m:val="p"/>
+                      </m:rPr>
+                      <m:t>=</m:t>
+                    </m:r>
+                    <m:r>
+                      <m:t>0.5</m:t>
+                    </m:r>
+                  </m:oMath>
+                </a14:m>
+                <a:r>
+                  <a:rPr/>
+                  <a:t> and </a:t>
+                </a:r>
+                <a14:m>
+                  <m:oMath xmlns:m="http://schemas.openxmlformats.org/officeDocument/2006/math">
+                    <m:r>
+                      <m:t>γ</m:t>
+                    </m:r>
+                    <m:r>
+                      <m:rPr>
+                        <m:sty m:val="p"/>
+                      </m:rPr>
+                      <m:t>=</m:t>
+                    </m:r>
+                    <m:r>
+                      <m:t>2</m:t>
+                    </m:r>
+                  </m:oMath>
+                </a14:m>
+                <a:br/>
+                <a:r>
+                  <a:rPr/>
+                  <a:t>5. Simulate gompertz distribution with </a:t>
+                </a:r>
+                <a14:m>
+                  <m:oMath xmlns:m="http://schemas.openxmlformats.org/officeDocument/2006/math">
+                    <m:r>
+                      <m:t>λ</m:t>
+                    </m:r>
+                    <m:r>
+                      <m:rPr>
+                        <m:sty m:val="p"/>
+                      </m:rPr>
+                      <m:t>=</m:t>
+                    </m:r>
+                    <m:r>
+                      <m:t>0.5</m:t>
+                    </m:r>
+                  </m:oMath>
+                </a14:m>
+                <a:r>
+                  <a:rPr/>
+                  <a:t> and </a:t>
+                </a:r>
+                <a14:m>
+                  <m:oMath xmlns:m="http://schemas.openxmlformats.org/officeDocument/2006/math">
+                    <m:r>
+                      <m:t>α</m:t>
+                    </m:r>
+                    <m:r>
+                      <m:rPr>
+                        <m:sty m:val="p"/>
+                      </m:rPr>
+                      <m:t>=</m:t>
+                    </m:r>
+                    <m:r>
+                      <m:t>2</m:t>
+                    </m:r>
+                  </m:oMath>
+                </a14:m>
+                <a:br/>
+              </a:p>
+            </p:txBody>
+          </p:sp>
+        </mc:Choice>
+      </mc:AlternateContent>
+      <p:sp>
+        <p:nvSpPr>
+          <p:cNvPr id="5" name="Footer Placeholder 4"/>
+          <p:cNvSpPr>
+            <a:spLocks noGrp="1"/>
+          </p:cNvSpPr>
+          <p:nvPr>
+            <p:ph idx="11" sz="quarter" type="ftr"/>
+          </p:nvPr>
+        </p:nvSpPr>
+        <p:spPr/>
+        <p:txBody>
+          <a:bodyPr/>
+          <a:lstStyle/>
+          <a:p>
+            <a:endParaRPr lang="en-US"/>
+          </a:p>
+        </p:txBody>
+      </p:sp>
+      <p:sp>
+        <p:nvSpPr>
+          <p:cNvPr id="6" name="Slide Number Placeholder 5"/>
+          <p:cNvSpPr>
+            <a:spLocks noGrp="1"/>
+          </p:cNvSpPr>
+          <p:nvPr>
+            <p:ph idx="12" sz="quarter" type="sldNum"/>
+          </p:nvPr>
+        </p:nvSpPr>
+        <p:spPr/>
+        <p:txBody>
+          <a:bodyPr/>
+          <a:lstStyle/>
+          <a:p>
+            <a:fld id="{C5EF2332-01BF-834F-8236-50238282D533}" type="slidenum">
+              <a:rPr lang="en-US" smtClean="0"/>
+              <a:t>‹#›</a:t>
+            </a:fld>
+            <a:endParaRPr lang="en-US"/>
+          </a:p>
+        </p:txBody>
+      </p:sp>
+    </p:spTree>
+  </p:cSld>
+</p:sld>
+</file>
+
+<file path=ppt/slides/slide8.xml><?xml version="1.0" encoding="utf-8"?>
+<p:sld xmlns:a="http://schemas.openxmlformats.org/drawingml/2006/main" xmlns:r="http://schemas.openxmlformats.org/officeDocument/2006/relationships" xmlns:p="http://schemas.openxmlformats.org/presentationml/2006/main">
+  <p:cSld>
+    <p:spTree>
+      <p:nvGrpSpPr>
+        <p:cNvPr id="1" name=""/>
+        <p:cNvGrpSpPr/>
+        <p:nvPr/>
+      </p:nvGrpSpPr>
+      <p:grpSpPr>
+        <a:xfrm>
+          <a:off x="0" y="0"/>
+          <a:ext cx="0" cy="0"/>
+          <a:chOff x="0" y="0"/>
+          <a:chExt cx="0" cy="0"/>
+        </a:xfrm>
+      </p:grpSpPr>
+      <p:sp>
+        <p:nvSpPr>
+          <p:cNvPr id="2" name="Title 1"/>
+          <p:cNvSpPr>
+            <a:spLocks noGrp="1"/>
+          </p:cNvSpPr>
+          <p:nvPr>
+            <p:ph type="title"/>
+          </p:nvPr>
+        </p:nvSpPr>
+        <p:spPr/>
+        <p:txBody>
+          <a:bodyPr/>
+          <a:lstStyle/>
+          <a:p>
+            <a:pPr lvl="0" indent="0" marL="0">
+              <a:buNone/>
+            </a:pPr>
+            <a:r>
+              <a:rPr/>
+              <a:t>…</a:t>
+            </a:r>
+          </a:p>
+        </p:txBody>
+      </p:sp>
+      <mc:AlternateContent xmlns:mc="http://schemas.openxmlformats.org/markup-compatibility/2006">
+        <mc:Choice xmlns:a14="http://schemas.microsoft.com/office/drawing/2010/main" Requires="a14">
+          <p:sp>
+            <p:nvSpPr>
+              <p:cNvPr id="3" name="Content Placeholder 2"/>
+              <p:cNvSpPr>
+                <a:spLocks noGrp="1"/>
+              </p:cNvSpPr>
+              <p:nvPr>
+                <p:ph idx="1"/>
+              </p:nvPr>
+            </p:nvSpPr>
+            <p:spPr/>
+            <p:txBody>
+              <a:bodyPr/>
+              <a:lstStyle/>
+              <a:p>
+                <a:pPr lvl="0" indent="0" marL="0">
+                  <a:buNone/>
+                </a:pPr>
+                <a14:m>
+                  <m:oMath xmlns:m="http://schemas.openxmlformats.org/officeDocument/2006/math">
+                    <m:acc>
+                      <m:accPr>
+                        <m:chr m:val="̂"/>
+                      </m:accPr>
+                      <m:e>
+                        <m:r>
+                          <m:t>β</m:t>
+                        </m:r>
+                      </m:e>
+                    </m:acc>
+                  </m:oMath>
+                </a14:m>
+                <a:br/>
+                <a:br/>
+                <a14:m>
+                  <m:oMath xmlns:m="http://schemas.openxmlformats.org/officeDocument/2006/math">
+                    <m:r>
+                      <m:t>B</m:t>
+                    </m:r>
+                    <m:r>
+                      <m:t>i</m:t>
+                    </m:r>
+                    <m:r>
+                      <m:t>a</m:t>
+                    </m:r>
+                    <m:r>
+                      <m:t>s</m:t>
+                    </m:r>
+                    <m:r>
+                      <m:rPr>
+                        <m:sty m:val="p"/>
+                      </m:rPr>
+                      <m:t>=</m:t>
+                    </m:r>
+                    <m:f>
+                      <m:fPr>
+                        <m:type m:val="bar"/>
+                      </m:fPr>
+                      <m:num>
+                        <m:r>
+                          <m:t>1</m:t>
+                        </m:r>
+                      </m:num>
+                      <m:den>
+                        <m:r>
+                          <m:t>k</m:t>
+                        </m:r>
+                      </m:den>
+                    </m:f>
+                    <m:nary>
+                      <m:naryPr>
+                        <m:chr m:val="∑"/>
+                        <m:limLoc m:val="undOvr"/>
+                        <m:subHide m:val="0"/>
+                        <m:supHide m:val="0"/>
+                      </m:naryPr>
+                      <m:sub>
+                        <m:r>
+                          <m:t>i</m:t>
+                        </m:r>
+                        <m:r>
+                          <m:rPr>
+                            <m:sty m:val="p"/>
+                          </m:rPr>
+                          <m:t>=</m:t>
+                        </m:r>
+                        <m:r>
+                          <m:t>1</m:t>
+                        </m:r>
+                      </m:sub>
+                      <m:sup>
+                        <m:r>
+                          <m:t>k</m:t>
+                        </m:r>
+                      </m:sup>
+                      <m:e>
+                        <m:d>
+                          <m:dPr>
+                            <m:begChr m:val="("/>
+                            <m:endChr m:val=")"/>
+                            <m:sepChr m:val=""/>
+                            <m:grow/>
+                          </m:dPr>
+                          <m:e>
+                            <m:acc>
+                              <m:accPr>
+                                <m:chr m:val="̂"/>
+                              </m:accPr>
+                              <m:e>
+                                <m:sSup>
+                                  <m:e>
+                                    <m:r>
+                                      <m:t>β</m:t>
+                                    </m:r>
+                                  </m:e>
+                                  <m:sup>
+                                    <m:d>
+                                      <m:dPr>
+                                        <m:begChr m:val="("/>
+                                        <m:endChr m:val=")"/>
+                                        <m:sepChr m:val=""/>
+                                        <m:grow/>
+                                      </m:dPr>
+                                      <m:e>
+                                        <m:r>
+                                          <m:t>k</m:t>
+                                        </m:r>
+                                      </m:e>
+                                    </m:d>
+                                  </m:sup>
+                                </m:sSup>
+                              </m:e>
+                            </m:acc>
+                            <m:r>
+                              <m:rPr>
+                                <m:sty m:val="p"/>
+                              </m:rPr>
+                              <m:t>−</m:t>
+                            </m:r>
+                            <m:r>
+                              <m:t>β</m:t>
+                            </m:r>
+                          </m:e>
+                        </m:d>
+                      </m:e>
+                    </m:nary>
+                    <m:r>
+                      <m:rPr>
+                        <m:sty m:val="p"/>
+                      </m:rPr>
+                      <m:t>=</m:t>
+                    </m:r>
+                    <m:f>
+                      <m:fPr>
+                        <m:type m:val="bar"/>
+                      </m:fPr>
+                      <m:num>
+                        <m:r>
+                          <m:t>1</m:t>
+                        </m:r>
+                      </m:num>
+                      <m:den>
+                        <m:r>
+                          <m:t>k</m:t>
+                        </m:r>
+                      </m:den>
+                    </m:f>
+                    <m:nary>
+                      <m:naryPr>
+                        <m:chr m:val="∑"/>
+                        <m:limLoc m:val="undOvr"/>
+                        <m:subHide m:val="0"/>
+                        <m:supHide m:val="0"/>
+                      </m:naryPr>
+                      <m:sub>
+                        <m:r>
+                          <m:t>i</m:t>
+                        </m:r>
+                        <m:r>
+                          <m:rPr>
+                            <m:sty m:val="p"/>
+                          </m:rPr>
+                          <m:t>=</m:t>
+                        </m:r>
+                        <m:r>
+                          <m:t>1</m:t>
+                        </m:r>
+                      </m:sub>
+                      <m:sup>
+                        <m:r>
+                          <m:t>k</m:t>
+                        </m:r>
+                      </m:sup>
+                      <m:e>
+                        <m:d>
+                          <m:dPr>
+                            <m:begChr m:val="("/>
+                            <m:endChr m:val=")"/>
+                            <m:sepChr m:val=""/>
+                            <m:grow/>
+                          </m:dPr>
+                          <m:e>
+                            <m:acc>
+                              <m:accPr>
+                                <m:chr m:val="̂"/>
+                              </m:accPr>
+                              <m:e>
+                                <m:sSup>
+                                  <m:e>
+                                    <m:r>
+                                      <m:t>β</m:t>
+                                    </m:r>
+                                  </m:e>
+                                  <m:sup>
+                                    <m:d>
+                                      <m:dPr>
+                                        <m:begChr m:val="("/>
+                                        <m:endChr m:val=")"/>
+                                        <m:sepChr m:val=""/>
+                                        <m:grow/>
+                                      </m:dPr>
+                                      <m:e>
+                                        <m:r>
+                                          <m:t>k</m:t>
+                                        </m:r>
+                                      </m:e>
+                                    </m:d>
+                                  </m:sup>
+                                </m:sSup>
+                              </m:e>
+                            </m:acc>
+                            <m:r>
+                              <m:rPr>
+                                <m:sty m:val="p"/>
+                              </m:rPr>
+                              <m:t>−</m:t>
+                            </m:r>
+                            <m:r>
+                              <m:t>2</m:t>
+                            </m:r>
+                          </m:e>
+                        </m:d>
+                      </m:e>
+                    </m:nary>
+                  </m:oMath>
+                </a14:m>
+                <a:br/>
+                <a14:m>
+                  <m:oMath xmlns:m="http://schemas.openxmlformats.org/officeDocument/2006/math">
+                    <m:r>
+                      <m:t>V</m:t>
+                    </m:r>
+                    <m:r>
+                      <m:t>a</m:t>
+                    </m:r>
+                    <m:r>
+                      <m:t>r</m:t>
+                    </m:r>
+                    <m:r>
+                      <m:t>i</m:t>
+                    </m:r>
+                    <m:r>
+                      <m:t>a</m:t>
+                    </m:r>
+                    <m:r>
+                      <m:t>n</m:t>
+                    </m:r>
+                    <m:r>
+                      <m:t>c</m:t>
+                    </m:r>
+                    <m:r>
+                      <m:t>e</m:t>
+                    </m:r>
+                    <m:r>
+                      <m:rPr>
+                        <m:sty m:val="p"/>
+                      </m:rPr>
+                      <m:t>=</m:t>
+                    </m:r>
+                    <m:f>
+                      <m:fPr>
+                        <m:type m:val="bar"/>
+                      </m:fPr>
+                      <m:num>
+                        <m:r>
+                          <m:t>1</m:t>
+                        </m:r>
+                      </m:num>
+                      <m:den>
+                        <m:r>
+                          <m:t>k</m:t>
+                        </m:r>
+                        <m:r>
+                          <m:rPr>
+                            <m:sty m:val="p"/>
+                          </m:rPr>
+                          <m:t>−</m:t>
+                        </m:r>
+                        <m:r>
+                          <m:t>1</m:t>
+                        </m:r>
+                      </m:den>
+                    </m:f>
+                    <m:nary>
+                      <m:naryPr>
+                        <m:chr m:val="∑"/>
+                        <m:limLoc m:val="undOvr"/>
+                        <m:subHide m:val="0"/>
+                        <m:supHide m:val="0"/>
+                      </m:naryPr>
+                      <m:sub>
+                        <m:r>
+                          <m:t>i</m:t>
+                        </m:r>
+                        <m:r>
+                          <m:rPr>
+                            <m:sty m:val="p"/>
+                          </m:rPr>
+                          <m:t>=</m:t>
+                        </m:r>
+                        <m:r>
+                          <m:t>1</m:t>
+                        </m:r>
+                      </m:sub>
+                      <m:sup>
+                        <m:r>
+                          <m:t>k</m:t>
+                        </m:r>
+                      </m:sup>
+                      <m:e>
+                        <m:acc>
+                          <m:accPr>
+                            <m:chr m:val="̂"/>
+                          </m:accPr>
+                          <m:e>
+                            <m:r>
+                              <m:rPr>
+                                <m:sty m:val="p"/>
+                              </m:rPr>
+                              <m:t>(</m:t>
+                            </m:r>
+                            <m:sSup>
+                              <m:e>
+                                <m:r>
+                                  <m:t>β</m:t>
+                                </m:r>
+                              </m:e>
+                              <m:sup>
+                                <m:d>
+                                  <m:dPr>
+                                    <m:begChr m:val="("/>
+                                    <m:endChr m:val=")"/>
+                                    <m:sepChr m:val=""/>
+                                    <m:grow/>
+                                  </m:dPr>
+                                  <m:e>
+                                    <m:r>
+                                      <m:t>k</m:t>
+                                    </m:r>
+                                  </m:e>
+                                </m:d>
+                              </m:sup>
+                            </m:sSup>
+                          </m:e>
+                        </m:acc>
+                      </m:e>
+                    </m:nary>
+                    <m:r>
+                      <m:rPr>
+                        <m:sty m:val="p"/>
+                      </m:rPr>
+                      <m:t>−</m:t>
+                    </m:r>
+                    <m:r>
+                      <m:t>β</m:t>
+                    </m:r>
+                    <m:sSup>
+                      <m:e>
+                        <m:r>
+                          <m:rPr>
+                            <m:sty m:val="p"/>
+                          </m:rPr>
+                          <m:t>)</m:t>
+                        </m:r>
+                      </m:e>
+                      <m:sup>
+                        <m:r>
+                          <m:t>2</m:t>
+                        </m:r>
+                      </m:sup>
+                    </m:sSup>
+                    <m:r>
+                      <m:rPr>
+                        <m:sty m:val="p"/>
+                      </m:rPr>
+                      <m:t>=</m:t>
+                    </m:r>
+                    <m:f>
+                      <m:fPr>
+                        <m:type m:val="bar"/>
+                      </m:fPr>
+                      <m:num>
+                        <m:r>
+                          <m:t>1</m:t>
+                        </m:r>
+                      </m:num>
+                      <m:den>
+                        <m:r>
+                          <m:t>k</m:t>
+                        </m:r>
+                        <m:r>
+                          <m:rPr>
+                            <m:sty m:val="p"/>
+                          </m:rPr>
+                          <m:t>−</m:t>
+                        </m:r>
+                        <m:r>
+                          <m:t>1</m:t>
+                        </m:r>
+                      </m:den>
+                    </m:f>
+                    <m:nary>
+                      <m:naryPr>
+                        <m:chr m:val="∑"/>
+                        <m:limLoc m:val="undOvr"/>
+                        <m:subHide m:val="0"/>
+                        <m:supHide m:val="0"/>
+                      </m:naryPr>
+                      <m:sub>
+                        <m:r>
+                          <m:t>i</m:t>
+                        </m:r>
+                        <m:r>
+                          <m:rPr>
+                            <m:sty m:val="p"/>
+                          </m:rPr>
+                          <m:t>=</m:t>
+                        </m:r>
+                        <m:r>
+                          <m:t>1</m:t>
+                        </m:r>
+                      </m:sub>
+                      <m:sup>
+                        <m:r>
+                          <m:t>k</m:t>
+                        </m:r>
+                      </m:sup>
+                      <m:e>
+                        <m:acc>
+                          <m:accPr>
+                            <m:chr m:val="̂"/>
+                          </m:accPr>
+                          <m:e>
+                            <m:r>
+                              <m:rPr>
+                                <m:sty m:val="p"/>
+                              </m:rPr>
+                              <m:t>(</m:t>
+                            </m:r>
+                            <m:sSup>
+                              <m:e>
+                                <m:r>
+                                  <m:t>β</m:t>
+                                </m:r>
+                              </m:e>
+                              <m:sup>
+                                <m:d>
+                                  <m:dPr>
+                                    <m:begChr m:val="("/>
+                                    <m:endChr m:val=")"/>
+                                    <m:sepChr m:val=""/>
+                                    <m:grow/>
+                                  </m:dPr>
+                                  <m:e>
+                                    <m:r>
+                                      <m:t>k</m:t>
+                                    </m:r>
+                                  </m:e>
+                                </m:d>
+                              </m:sup>
+                            </m:sSup>
+                          </m:e>
+                        </m:acc>
+                      </m:e>
+                    </m:nary>
+                    <m:r>
+                      <m:rPr>
+                        <m:sty m:val="p"/>
+                      </m:rPr>
+                      <m:t>−</m:t>
+                    </m:r>
+                    <m:r>
+                      <m:t>2</m:t>
+                    </m:r>
+                    <m:sSup>
+                      <m:e>
+                        <m:r>
+                          <m:rPr>
+                            <m:sty m:val="p"/>
+                          </m:rPr>
+                          <m:t>)</m:t>
+                        </m:r>
+                      </m:e>
+                      <m:sup>
+                        <m:r>
+                          <m:t>2</m:t>
+                        </m:r>
+                      </m:sup>
+                    </m:sSup>
+                  </m:oMath>
+                </a14:m>
+                <a:br/>
+                <a14:m>
+                  <m:oMath xmlns:m="http://schemas.openxmlformats.org/officeDocument/2006/math">
+                    <m:r>
+                      <m:t>M</m:t>
+                    </m:r>
+                    <m:r>
+                      <m:t>S</m:t>
+                    </m:r>
+                    <m:r>
+                      <m:t>E</m:t>
+                    </m:r>
+                    <m:r>
+                      <m:rPr>
+                        <m:sty m:val="p"/>
+                      </m:rPr>
+                      <m:t>=</m:t>
+                    </m:r>
+                    <m:f>
+                      <m:fPr>
+                        <m:type m:val="bar"/>
+                      </m:fPr>
+                      <m:num>
+                        <m:r>
+                          <m:t>1</m:t>
+                        </m:r>
+                      </m:num>
+                      <m:den>
+                        <m:r>
+                          <m:t>k</m:t>
+                        </m:r>
+                      </m:den>
+                    </m:f>
+                    <m:nary>
+                      <m:naryPr>
+                        <m:chr m:val="∑"/>
+                        <m:limLoc m:val="undOvr"/>
+                        <m:subHide m:val="0"/>
+                        <m:supHide m:val="0"/>
+                      </m:naryPr>
+                      <m:sub>
+                        <m:r>
+                          <m:t>i</m:t>
+                        </m:r>
+                        <m:r>
+                          <m:rPr>
+                            <m:sty m:val="p"/>
+                          </m:rPr>
+                          <m:t>=</m:t>
+                        </m:r>
+                        <m:r>
+                          <m:t>1</m:t>
+                        </m:r>
+                      </m:sub>
+                      <m:sup>
+                        <m:r>
+                          <m:t>k</m:t>
+                        </m:r>
+                      </m:sup>
+                      <m:e>
+                        <m:sSup>
+                          <m:e>
+                            <m:d>
+                              <m:dPr>
+                                <m:begChr m:val="("/>
+                                <m:endChr m:val=")"/>
+                                <m:sepChr m:val=""/>
+                                <m:grow/>
+                              </m:dPr>
+                              <m:e>
+                                <m:acc>
+                                  <m:accPr>
+                                    <m:chr m:val="̂"/>
+                                  </m:accPr>
+                                  <m:e>
+                                    <m:sSup>
+                                      <m:e>
+                                        <m:r>
+                                          <m:t>β</m:t>
+                                        </m:r>
+                                      </m:e>
+                                      <m:sup>
+                                        <m:d>
+                                          <m:dPr>
+                                            <m:begChr m:val="("/>
+                                            <m:endChr m:val=")"/>
+                                            <m:sepChr m:val=""/>
+                                            <m:grow/>
+                                          </m:dPr>
+                                          <m:e>
+                                            <m:r>
+                                              <m:t>k</m:t>
+                                            </m:r>
+                                          </m:e>
+                                        </m:d>
+                                      </m:sup>
+                                    </m:sSup>
+                                  </m:e>
+                                </m:acc>
+                                <m:r>
+                                  <m:rPr>
+                                    <m:sty m:val="p"/>
+                                  </m:rPr>
+                                  <m:t>−</m:t>
+                                </m:r>
+                                <m:r>
+                                  <m:t>β</m:t>
+                                </m:r>
+                              </m:e>
+                            </m:d>
+                          </m:e>
+                          <m:sup>
+                            <m:r>
+                              <m:t>2</m:t>
+                            </m:r>
+                          </m:sup>
+                        </m:sSup>
+                      </m:e>
+                    </m:nary>
+                    <m:r>
+                      <m:rPr>
+                        <m:sty m:val="p"/>
+                      </m:rPr>
+                      <m:t>=</m:t>
+                    </m:r>
+                    <m:f>
+                      <m:fPr>
+                        <m:type m:val="bar"/>
+                      </m:fPr>
+                      <m:num>
+                        <m:r>
+                          <m:t>1</m:t>
+                        </m:r>
+                      </m:num>
+                      <m:den>
+                        <m:r>
+                          <m:t>k</m:t>
+                        </m:r>
+                      </m:den>
+                    </m:f>
+                    <m:nary>
+                      <m:naryPr>
+                        <m:chr m:val="∑"/>
+                        <m:limLoc m:val="undOvr"/>
+                        <m:subHide m:val="0"/>
+                        <m:supHide m:val="0"/>
+                      </m:naryPr>
+                      <m:sub>
+                        <m:r>
+                          <m:t>i</m:t>
+                        </m:r>
+                        <m:r>
+                          <m:rPr>
+                            <m:sty m:val="p"/>
+                          </m:rPr>
+                          <m:t>=</m:t>
+                        </m:r>
+                        <m:r>
+                          <m:t>1</m:t>
+                        </m:r>
+                      </m:sub>
+                      <m:sup>
+                        <m:r>
+                          <m:t>k</m:t>
+                        </m:r>
+                      </m:sup>
+                      <m:e>
+                        <m:sSup>
+                          <m:e>
+                            <m:d>
+                              <m:dPr>
+                                <m:begChr m:val="("/>
+                                <m:endChr m:val=")"/>
+                                <m:sepChr m:val=""/>
+                                <m:grow/>
+                              </m:dPr>
+                              <m:e>
+                                <m:acc>
+                                  <m:accPr>
+                                    <m:chr m:val="̂"/>
+                                  </m:accPr>
+                                  <m:e>
+                                    <m:sSup>
+                                      <m:e>
+                                        <m:r>
+                                          <m:t>β</m:t>
+                                        </m:r>
+                                      </m:e>
+                                      <m:sup>
+                                        <m:d>
+                                          <m:dPr>
+                                            <m:begChr m:val="("/>
+                                            <m:endChr m:val=")"/>
+                                            <m:sepChr m:val=""/>
+                                            <m:grow/>
+                                          </m:dPr>
+                                          <m:e>
+                                            <m:r>
+                                              <m:t>k</m:t>
+                                            </m:r>
+                                          </m:e>
+                                        </m:d>
+                                      </m:sup>
+                                    </m:sSup>
+                                  </m:e>
+                                </m:acc>
+                                <m:r>
+                                  <m:rPr>
+                                    <m:sty m:val="p"/>
+                                  </m:rPr>
+                                  <m:t>−</m:t>
+                                </m:r>
+                                <m:r>
+                                  <m:t>2</m:t>
+                                </m:r>
+                              </m:e>
+                            </m:d>
+                          </m:e>
+                          <m:sup>
+                            <m:r>
+                              <m:t>2</m:t>
+                            </m:r>
+                          </m:sup>
+                        </m:sSup>
+                      </m:e>
+                    </m:nary>
+                  </m:oMath>
+                </a14:m>
+                <a:br/>
+              </a:p>
+            </p:txBody>
+          </p:sp>
+        </mc:Choice>
+      </mc:AlternateContent>
+      <p:sp>
+        <p:nvSpPr>
+          <p:cNvPr id="5" name="Footer Placeholder 4"/>
+          <p:cNvSpPr>
+            <a:spLocks noGrp="1"/>
+          </p:cNvSpPr>
+          <p:nvPr>
+            <p:ph idx="11" sz="quarter" type="ftr"/>
+          </p:nvPr>
+        </p:nvSpPr>
+        <p:spPr/>
+        <p:txBody>
+          <a:bodyPr/>
+          <a:lstStyle/>
+          <a:p>
+            <a:endParaRPr lang="en-US"/>
+          </a:p>
+        </p:txBody>
+      </p:sp>
+      <p:sp>
+        <p:nvSpPr>
+          <p:cNvPr id="6" name="Slide Number Placeholder 5"/>
+          <p:cNvSpPr>
+            <a:spLocks noGrp="1"/>
+          </p:cNvSpPr>
+          <p:nvPr>
+            <p:ph idx="12" sz="quarter" type="sldNum"/>
+          </p:nvPr>
+        </p:nvSpPr>
+        <p:spPr/>
+        <p:txBody>
+          <a:bodyPr/>
+          <a:lstStyle/>
+          <a:p>
+            <a:fld id="{C5EF2332-01BF-834F-8236-50238282D533}" type="slidenum">
+              <a:rPr lang="en-US" smtClean="0"/>
+              <a:t>‹#›</a:t>
+            </a:fld>
+            <a:endParaRPr lang="en-US"/>
+          </a:p>
+        </p:txBody>
+      </p:sp>
+    </p:spTree>
+  </p:cSld>
+</p:sld>
+</file>
+
+<file path=ppt/slides/slide9.xml><?xml version="1.0" encoding="utf-8"?>
+<p:sld xmlns:a="http://schemas.openxmlformats.org/drawingml/2006/main" xmlns:r="http://schemas.openxmlformats.org/officeDocument/2006/relationships" xmlns:p="http://schemas.openxmlformats.org/presentationml/2006/main">
+  <p:cSld>
+    <p:spTree>
+      <p:nvGrpSpPr>
+        <p:cNvPr id="1" name=""/>
+        <p:cNvGrpSpPr/>
+        <p:nvPr/>
+      </p:nvGrpSpPr>
+      <p:grpSpPr>
+        <a:xfrm>
+          <a:off x="0" y="0"/>
+          <a:ext cx="0" cy="0"/>
+          <a:chOff x="0" y="0"/>
+          <a:chExt cx="0" cy="0"/>
+        </a:xfrm>
+      </p:grpSpPr>
+      <p:sp>
+        <p:nvSpPr>
+          <p:cNvPr id="2" name="Title 1"/>
+          <p:cNvSpPr>
+            <a:spLocks noGrp="1"/>
+          </p:cNvSpPr>
+          <p:nvPr>
+            <p:ph type="title"/>
+          </p:nvPr>
+        </p:nvSpPr>
+        <p:spPr/>
+        <p:txBody>
+          <a:bodyPr/>
+          <a:lstStyle/>
+          <a:p>
+            <a:pPr lvl="0" indent="0" marL="0">
+              <a:buNone/>
+            </a:pPr>
+            <a:r>
+              <a:rPr/>
+              <a:t>…</a:t>
+            </a:r>
+          </a:p>
+        </p:txBody>
+      </p:sp>
+      <mc:AlternateContent xmlns:mc="http://schemas.openxmlformats.org/markup-compatibility/2006">
+        <mc:Choice xmlns:a14="http://schemas.microsoft.com/office/drawing/2010/main" Requires="a14">
+          <p:sp>
+            <p:nvSpPr>
+              <p:cNvPr id="3" name="Content Placeholder 2"/>
+              <p:cNvSpPr>
+                <a:spLocks noGrp="1"/>
+              </p:cNvSpPr>
+              <p:nvPr>
+                <p:ph idx="1"/>
+              </p:nvPr>
+            </p:nvSpPr>
+            <p:spPr/>
+            <p:txBody>
+              <a:bodyPr/>
+              <a:lstStyle/>
+              <a:p>
+                <a:pPr lvl="0" indent="0" marL="0">
+                  <a:buNone/>
+                </a:pPr>
+                <a:r>
+                  <a:rPr/>
+                  <a:t>Survival function, </a:t>
+                </a:r>
+                <a14:m>
+                  <m:oMath xmlns:m="http://schemas.openxmlformats.org/officeDocument/2006/math">
+                    <m:r>
+                      <m:t>S</m:t>
+                    </m:r>
+                    <m:d>
+                      <m:dPr>
+                        <m:begChr m:val="("/>
+                        <m:endChr m:val=")"/>
+                        <m:sepChr m:val=""/>
+                        <m:grow/>
+                      </m:dPr>
+                      <m:e>
+                        <m:r>
+                          <m:t>t</m:t>
+                        </m:r>
+                      </m:e>
+                    </m:d>
+                  </m:oMath>
+                </a14:m>
+                <a:r>
+                  <a:rPr/>
+                  <a:t> is the probability of observing individual survival time T beyond a certain time </a:t>
+                </a:r>
+                <a14:m>
+                  <m:oMath xmlns:m="http://schemas.openxmlformats.org/officeDocument/2006/math">
+                    <m:r>
+                      <m:t>t</m:t>
+                    </m:r>
+                  </m:oMath>
+                </a14:m>
+                <a:r>
+                  <a:rPr/>
+                  <a:t>.</a:t>
+                </a:r>
+                <a:br/>
+              </a:p>
+              <a:p>
+                <a:pPr lvl="0" indent="0" marL="0">
+                  <a:buNone/>
+                </a:pPr>
+                <a:r>
+                  <a:rPr/>
+                  <a:t>The Cumulative distribution function of the random variable survival time T, F(t)=Pr(T</a:t>
+                </a:r>
+                <a14:m>
+                  <m:oMath xmlns:m="http://schemas.openxmlformats.org/officeDocument/2006/math">
+                    <m:r>
+                      <m:rPr>
+                        <m:sty m:val="p"/>
+                      </m:rPr>
+                      <m:t>≤</m:t>
+                    </m:r>
+                  </m:oMath>
+                </a14:m>
+                <a:r>
+                  <a:rPr/>
+                  <a:t>t) is the probability of observing individual survival time T less than a certain time </a:t>
+                </a:r>
+                <a14:m>
+                  <m:oMath xmlns:m="http://schemas.openxmlformats.org/officeDocument/2006/math">
+                    <m:r>
+                      <m:t>t</m:t>
+                    </m:r>
+                  </m:oMath>
+                </a14:m>
+                <a:r>
+                  <a:rPr/>
+                  <a:t>.</a:t>
+                </a:r>
+                <a:br/>
+              </a:p>
+              <a:p>
+                <a:pPr lvl="0" indent="0" marL="0">
+                  <a:buNone/>
+                </a:pPr>
+                <a:r>
+                  <a:rPr/>
+                  <a:t>The Hazard function, </a:t>
+                </a:r>
+                <a14:m>
+                  <m:oMath xmlns:m="http://schemas.openxmlformats.org/officeDocument/2006/math">
+                    <m:r>
+                      <m:t>h</m:t>
+                    </m:r>
+                    <m:d>
+                      <m:dPr>
+                        <m:begChr m:val="("/>
+                        <m:endChr m:val=")"/>
+                        <m:sepChr m:val=""/>
+                        <m:grow/>
+                      </m:dPr>
+                      <m:e>
+                        <m:r>
+                          <m:t>t</m:t>
+                        </m:r>
+                      </m:e>
+                    </m:d>
+                  </m:oMath>
+                </a14:m>
+                <a:r>
+                  <a:rPr/>
+                  <a:t> is the product of </a:t>
+                </a:r>
+                <a14:m>
+                  <m:oMath xmlns:m="http://schemas.openxmlformats.org/officeDocument/2006/math">
+                    <m:sSub>
+                      <m:e>
+                        <m:r>
+                          <m:t>h</m:t>
+                        </m:r>
+                      </m:e>
+                      <m:sub>
+                        <m:r>
+                          <m:t>0</m:t>
+                        </m:r>
+                      </m:sub>
+                    </m:sSub>
+                    <m:d>
+                      <m:dPr>
+                        <m:begChr m:val="("/>
+                        <m:endChr m:val=")"/>
+                        <m:sepChr m:val=""/>
+                        <m:grow/>
+                      </m:dPr>
+                      <m:e>
+                        <m:r>
+                          <m:t>t</m:t>
+                        </m:r>
+                      </m:e>
+                    </m:d>
+                  </m:oMath>
+                </a14:m>
+                <a:r>
+                  <a:rPr/>
+                  <a:t> and </a:t>
+                </a:r>
+                <a14:m>
+                  <m:oMath xmlns:m="http://schemas.openxmlformats.org/officeDocument/2006/math">
+                    <m:r>
+                      <m:t>r</m:t>
+                    </m:r>
+                    <m:d>
+                      <m:dPr>
+                        <m:begChr m:val="("/>
+                        <m:endChr m:val=")"/>
+                        <m:sepChr m:val=""/>
+                        <m:grow/>
+                      </m:dPr>
+                      <m:e>
+                        <m:r>
+                          <m:t>X</m:t>
+                        </m:r>
+                        <m:r>
+                          <m:rPr>
+                            <m:sty m:val="p"/>
+                          </m:rPr>
+                          <m:t>,</m:t>
+                        </m:r>
+                        <m:r>
+                          <m:t>β</m:t>
+                        </m:r>
+                      </m:e>
+                    </m:d>
+                  </m:oMath>
+                </a14:m>
+                <a:r>
+                  <a:rPr/>
+                  <a:t>, which is defined as the ratio of probability density function of time variable and Survival function</a:t>
+                </a:r>
+                <a:br/>
+              </a:p>
+              <a:p>
+                <a:pPr lvl="0" indent="0" marL="0">
+                  <a:buNone/>
+                </a:pPr>
+                <a:r>
+                  <a:rPr/>
+                  <a:t>where </a:t>
+                </a:r>
+                <a14:m>
+                  <m:oMath xmlns:m="http://schemas.openxmlformats.org/officeDocument/2006/math">
+                    <m:sSub>
+                      <m:e>
+                        <m:r>
+                          <m:t>h</m:t>
+                        </m:r>
+                      </m:e>
+                      <m:sub>
+                        <m:r>
+                          <m:t>0</m:t>
+                        </m:r>
+                      </m:sub>
+                    </m:sSub>
+                    <m:d>
+                      <m:dPr>
+                        <m:begChr m:val="("/>
+                        <m:endChr m:val=")"/>
+                        <m:sepChr m:val=""/>
+                        <m:grow/>
+                      </m:dPr>
+                      <m:e>
+                        <m:r>
+                          <m:t>t</m:t>
+                        </m:r>
+                      </m:e>
+                    </m:d>
+                  </m:oMath>
+                </a14:m>
+                <a:r>
+                  <a:rPr/>
+                  <a:t> is the baseline hazard function, how the hazard function changes as a function of survival time T</a:t>
+                </a:r>
+                <a:br/>
+                <a14:m>
+                  <m:oMath xmlns:m="http://schemas.openxmlformats.org/officeDocument/2006/math">
+                    <m:r>
+                      <m:t>r</m:t>
+                    </m:r>
+                    <m:d>
+                      <m:dPr>
+                        <m:begChr m:val="("/>
+                        <m:endChr m:val=")"/>
+                        <m:sepChr m:val=""/>
+                        <m:grow/>
+                      </m:dPr>
+                      <m:e>
+                        <m:r>
+                          <m:t>X</m:t>
+                        </m:r>
+                        <m:r>
+                          <m:rPr>
+                            <m:sty m:val="p"/>
+                          </m:rPr>
+                          <m:t>,</m:t>
+                        </m:r>
+                        <m:r>
+                          <m:t>β</m:t>
+                        </m:r>
+                      </m:e>
+                    </m:d>
+                    <m:r>
+                      <m:rPr>
+                        <m:sty m:val="p"/>
+                      </m:rPr>
+                      <m:t>=</m:t>
+                    </m:r>
+                    <m:r>
+                      <m:t>e</m:t>
+                    </m:r>
+                    <m:r>
+                      <m:t>x</m:t>
+                    </m:r>
+                    <m:r>
+                      <m:t>p</m:t>
+                    </m:r>
+                    <m:d>
+                      <m:dPr>
+                        <m:begChr m:val="("/>
+                        <m:endChr m:val=")"/>
+                        <m:sepChr m:val=""/>
+                        <m:grow/>
+                      </m:dPr>
+                      <m:e>
+                        <m:r>
+                          <m:t>X</m:t>
+                        </m:r>
+                        <m:r>
+                          <m:t>β</m:t>
+                        </m:r>
+                      </m:e>
+                    </m:d>
+                  </m:oMath>
+                </a14:m>
+                <a:r>
+                  <a:rPr/>
+                  <a:t> is a function characterize how the hazard function changes as a function of covariate </a:t>
+                </a:r>
+                <a14:m>
+                  <m:oMath xmlns:m="http://schemas.openxmlformats.org/officeDocument/2006/math">
+                    <m:sSub>
+                      <m:e>
+                        <m:r>
+                          <m:t>X</m:t>
+                        </m:r>
+                      </m:e>
+                      <m:sub>
+                        <m:r>
+                          <m:t>t</m:t>
+                        </m:r>
+                        <m:r>
+                          <m:t>r</m:t>
+                        </m:r>
+                        <m:r>
+                          <m:t>e</m:t>
+                        </m:r>
+                        <m:r>
+                          <m:t>a</m:t>
+                        </m:r>
+                        <m:r>
+                          <m:t>t</m:t>
+                        </m:r>
+                        <m:r>
+                          <m:t>m</m:t>
+                        </m:r>
+                        <m:r>
+                          <m:t>e</m:t>
+                        </m:r>
+                        <m:r>
+                          <m:t>n</m:t>
+                        </m:r>
+                        <m:r>
+                          <m:t>t</m:t>
+                        </m:r>
+                      </m:sub>
+                    </m:sSub>
+                  </m:oMath>
+                </a14:m>
+                <a:br/>
+              </a:p>
+              <a:p>
+                <a:pPr lvl="0" indent="0" marL="0">
+                  <a:buNone/>
+                </a:pPr>
+                <a:r>
+                  <a:rPr/>
+                  <a:t>Cumulative hazard function i</a:t>
+                </a:r>
+              </a:p>
+            </p:txBody>
+          </p:sp>
+        </mc:Choice>
+      </mc:AlternateContent>
       <p:sp>
         <p:nvSpPr>
           <p:cNvPr id="5" name="Footer Placeholder 4"/>

</xml_diff>